<commit_message>
Add GitHub QR Code to Presentation
</commit_message>
<xml_diff>
--- a/T-SQL - Beyond the Basics.pptx
+++ b/T-SQL - Beyond the Basics.pptx
@@ -116,13 +116,18 @@
       </a:defRPr>
     </a:lvl9pPr>
   </p:defaultTextStyle>
+  <p:extLst>
+    <p:ext uri="{EFAFB233-063F-42B5-8137-9DF3F51BA10A}">
+      <p15:sldGuideLst xmlns:p15="http://schemas.microsoft.com/office/powerpoint/2012/main"/>
+    </p:ext>
+  </p:extLst>
 </p:presentation>
 </file>
 
 <file path=ppt/revisionInfo.xml><?xml version="1.0" encoding="utf-8"?>
 <p1510:revInfo xmlns:a="http://schemas.openxmlformats.org/drawingml/2006/main" xmlns:r="http://schemas.openxmlformats.org/officeDocument/2006/relationships" xmlns:p1510="http://schemas.microsoft.com/office/powerpoint/2015/10/main">
   <p1510:revLst>
-    <p1510:client id="{2867BBFD-B590-4669-965D-FBE3C6AC3DEC}" v="23" dt="2019-09-23T20:08:45.876"/>
+    <p1510:client id="{2867BBFD-B590-4669-965D-FBE3C6AC3DEC}" v="24" dt="2019-10-02T20:05:36.989"/>
   </p1510:revLst>
 </p1510:revInfo>
 </file>
@@ -132,10 +137,25 @@
   <pc:docChgLst>
     <pc:chgData name="Barney Lawrence" userId="993b92e47e495d54" providerId="LiveId" clId="{2867BBFD-B590-4669-965D-FBE3C6AC3DEC}"/>
     <pc:docChg chg="custSel addSld modSld">
-      <pc:chgData name="Barney Lawrence" userId="993b92e47e495d54" providerId="LiveId" clId="{2867BBFD-B590-4669-965D-FBE3C6AC3DEC}" dt="2019-09-23T20:08:55.239" v="163" actId="20577"/>
+      <pc:chgData name="Barney Lawrence" userId="993b92e47e495d54" providerId="LiveId" clId="{2867BBFD-B590-4669-965D-FBE3C6AC3DEC}" dt="2019-10-02T20:06:01.195" v="169" actId="1076"/>
       <pc:docMkLst>
         <pc:docMk/>
       </pc:docMkLst>
+      <pc:sldChg chg="addSp modSp">
+        <pc:chgData name="Barney Lawrence" userId="993b92e47e495d54" providerId="LiveId" clId="{2867BBFD-B590-4669-965D-FBE3C6AC3DEC}" dt="2019-10-02T20:06:01.195" v="169" actId="1076"/>
+        <pc:sldMkLst>
+          <pc:docMk/>
+          <pc:sldMk cId="2778868715" sldId="256"/>
+        </pc:sldMkLst>
+        <pc:picChg chg="add mod">
+          <ac:chgData name="Barney Lawrence" userId="993b92e47e495d54" providerId="LiveId" clId="{2867BBFD-B590-4669-965D-FBE3C6AC3DEC}" dt="2019-10-02T20:06:01.195" v="169" actId="1076"/>
+          <ac:picMkLst>
+            <pc:docMk/>
+            <pc:sldMk cId="2778868715" sldId="256"/>
+            <ac:picMk id="4" creationId="{4BE8913A-F9B3-46C9-BB49-0AF66A9BA9FC}"/>
+          </ac:picMkLst>
+        </pc:picChg>
+      </pc:sldChg>
       <pc:sldChg chg="modSp modAnim">
         <pc:chgData name="Barney Lawrence" userId="993b92e47e495d54" providerId="LiveId" clId="{2867BBFD-B590-4669-965D-FBE3C6AC3DEC}" dt="2019-09-23T20:03:18.218" v="4"/>
         <pc:sldMkLst>
@@ -492,7 +512,7 @@
             <a:fld id="{5586B75A-687E-405C-8A0B-8D00578BA2C3}" type="datetimeFigureOut">
               <a:rPr lang="en-US" dirty="0"/>
               <a:pPr/>
-              <a:t>9/23/2019</a:t>
+              <a:t>10/2/2019</a:t>
             </a:fld>
             <a:endParaRPr lang="en-US" dirty="0"/>
           </a:p>
@@ -678,7 +698,7 @@
           <a:p>
             <a:fld id="{5F4E5243-F52A-4D37-9694-EB26C6C31910}" type="datetimeFigureOut">
               <a:rPr lang="en-US" dirty="0"/>
-              <a:t>9/23/2019</a:t>
+              <a:t>10/2/2019</a:t>
             </a:fld>
             <a:endParaRPr lang="en-US" dirty="0"/>
           </a:p>
@@ -853,7 +873,7 @@
           <a:p>
             <a:fld id="{3A77B6E1-634A-48DC-9E8B-D894023267EF}" type="datetimeFigureOut">
               <a:rPr lang="en-US" dirty="0"/>
-              <a:t>9/23/2019</a:t>
+              <a:t>10/2/2019</a:t>
             </a:fld>
             <a:endParaRPr lang="en-US" dirty="0"/>
           </a:p>
@@ -1018,7 +1038,7 @@
           <a:p>
             <a:fld id="{7B2D3E9E-A95C-48F2-B4BF-A71542E0BE9A}" type="datetimeFigureOut">
               <a:rPr lang="en-US" dirty="0"/>
-              <a:t>9/23/2019</a:t>
+              <a:t>10/2/2019</a:t>
             </a:fld>
             <a:endParaRPr lang="en-US" dirty="0"/>
           </a:p>
@@ -1270,7 +1290,7 @@
             <a:fld id="{5586B75A-687E-405C-8A0B-8D00578BA2C3}" type="datetimeFigureOut">
               <a:rPr lang="en-US" dirty="0"/>
               <a:pPr/>
-              <a:t>9/23/2019</a:t>
+              <a:t>10/2/2019</a:t>
             </a:fld>
             <a:endParaRPr lang="en-US" dirty="0"/>
           </a:p>
@@ -1554,7 +1574,7 @@
           <a:p>
             <a:fld id="{F12952B5-7A2F-4CC8-B7CE-9234E21C2837}" type="datetimeFigureOut">
               <a:rPr lang="en-US" dirty="0"/>
-              <a:t>9/23/2019</a:t>
+              <a:t>10/2/2019</a:t>
             </a:fld>
             <a:endParaRPr lang="en-US" dirty="0"/>
           </a:p>
@@ -1987,7 +2007,7 @@
           <a:p>
             <a:fld id="{CE1DA07A-9201-4B4B-BAF2-015AFA30F520}" type="datetimeFigureOut">
               <a:rPr lang="en-US" dirty="0"/>
-              <a:t>9/23/2019</a:t>
+              <a:t>10/2/2019</a:t>
             </a:fld>
             <a:endParaRPr lang="en-US" dirty="0"/>
           </a:p>
@@ -2100,7 +2120,7 @@
           <a:p>
             <a:fld id="{73D7E00A-486F-4252-8B1D-E32645521F49}" type="datetimeFigureOut">
               <a:rPr lang="en-US" dirty="0"/>
-              <a:t>9/23/2019</a:t>
+              <a:t>10/2/2019</a:t>
             </a:fld>
             <a:endParaRPr lang="en-US" dirty="0"/>
           </a:p>
@@ -2190,7 +2210,7 @@
           <a:p>
             <a:fld id="{8DDF5F92-E675-4B36-9A60-69A962A68675}" type="datetimeFigureOut">
               <a:rPr lang="en-US" dirty="0"/>
-              <a:t>9/23/2019</a:t>
+              <a:t>10/2/2019</a:t>
             </a:fld>
             <a:endParaRPr lang="en-US" dirty="0"/>
           </a:p>
@@ -2541,7 +2561,7 @@
           <a:p>
             <a:fld id="{AF6E2C9B-5FA2-460D-9BE7-B0812FC2A6FF}" type="datetimeFigureOut">
               <a:rPr lang="en-US" dirty="0"/>
-              <a:t>9/23/2019</a:t>
+              <a:t>10/2/2019</a:t>
             </a:fld>
             <a:endParaRPr lang="en-US" dirty="0"/>
           </a:p>
@@ -2854,7 +2874,7 @@
             <a:fld id="{5586B75A-687E-405C-8A0B-8D00578BA2C3}" type="datetimeFigureOut">
               <a:rPr lang="en-US" dirty="0"/>
               <a:pPr/>
-              <a:t>9/23/2019</a:t>
+              <a:t>10/2/2019</a:t>
             </a:fld>
             <a:endParaRPr lang="en-US" dirty="0"/>
           </a:p>
@@ -3084,7 +3104,7 @@
             <a:fld id="{5586B75A-687E-405C-8A0B-8D00578BA2C3}" type="datetimeFigureOut">
               <a:rPr lang="en-US" dirty="0"/>
               <a:pPr/>
-              <a:t>9/23/2019</a:t>
+              <a:t>10/2/2019</a:t>
             </a:fld>
             <a:endParaRPr lang="en-US" dirty="0"/>
           </a:p>
@@ -3582,6 +3602,36 @@
           </a:p>
         </p:txBody>
       </p:sp>
+      <p:pic>
+        <p:nvPicPr>
+          <p:cNvPr id="4" name="Picture 3">
+            <a:extLst>
+              <a:ext uri="{FF2B5EF4-FFF2-40B4-BE49-F238E27FC236}">
+                <a16:creationId xmlns:a16="http://schemas.microsoft.com/office/drawing/2014/main" id="{4BE8913A-F9B3-46C9-BB49-0AF66A9BA9FC}"/>
+              </a:ext>
+            </a:extLst>
+          </p:cNvPr>
+          <p:cNvPicPr>
+            <a:picLocks noChangeAspect="1"/>
+          </p:cNvPicPr>
+          <p:nvPr/>
+        </p:nvPicPr>
+        <p:blipFill>
+          <a:blip r:embed="rId2"/>
+          <a:stretch>
+            <a:fillRect/>
+          </a:stretch>
+        </p:blipFill>
+        <p:spPr>
+          <a:xfrm>
+            <a:off x="9004598" y="3648891"/>
+            <a:ext cx="2342681" cy="2357323"/>
+          </a:xfrm>
+          <a:prstGeom prst="rect">
+            <a:avLst/>
+          </a:prstGeom>
+        </p:spPr>
+      </p:pic>
     </p:spTree>
     <p:extLst>
       <p:ext uri="{BB962C8B-B14F-4D97-AF65-F5344CB8AC3E}">

</xml_diff>

<commit_message>
Rename for Session Sequence Edits after test runs
</commit_message>
<xml_diff>
--- a/T-SQL - Beyond the Basics.pptx
+++ b/T-SQL - Beyond the Basics.pptx
@@ -10,14 +10,21 @@
     <p:sldId id="258" r:id="rId4"/>
     <p:sldId id="259" r:id="rId5"/>
     <p:sldId id="260" r:id="rId6"/>
-    <p:sldId id="261" r:id="rId7"/>
-    <p:sldId id="262" r:id="rId8"/>
-    <p:sldId id="263" r:id="rId9"/>
-    <p:sldId id="264" r:id="rId10"/>
-    <p:sldId id="265" r:id="rId11"/>
-    <p:sldId id="266" r:id="rId12"/>
-    <p:sldId id="267" r:id="rId13"/>
-    <p:sldId id="268" r:id="rId14"/>
+    <p:sldId id="269" r:id="rId7"/>
+    <p:sldId id="270" r:id="rId8"/>
+    <p:sldId id="271" r:id="rId9"/>
+    <p:sldId id="272" r:id="rId10"/>
+    <p:sldId id="273" r:id="rId11"/>
+    <p:sldId id="274" r:id="rId12"/>
+    <p:sldId id="261" r:id="rId13"/>
+    <p:sldId id="275" r:id="rId14"/>
+    <p:sldId id="262" r:id="rId15"/>
+    <p:sldId id="263" r:id="rId16"/>
+    <p:sldId id="264" r:id="rId17"/>
+    <p:sldId id="265" r:id="rId18"/>
+    <p:sldId id="266" r:id="rId19"/>
+    <p:sldId id="267" r:id="rId20"/>
+    <p:sldId id="268" r:id="rId21"/>
   </p:sldIdLst>
   <p:sldSz cx="12192000" cy="6858000"/>
   <p:notesSz cx="6858000" cy="9144000"/>
@@ -127,7 +134,7 @@
 <file path=ppt/revisionInfo.xml><?xml version="1.0" encoding="utf-8"?>
 <p1510:revInfo xmlns:a="http://schemas.openxmlformats.org/drawingml/2006/main" xmlns:r="http://schemas.openxmlformats.org/officeDocument/2006/relationships" xmlns:p1510="http://schemas.microsoft.com/office/powerpoint/2015/10/main">
   <p1510:revLst>
-    <p1510:client id="{2867BBFD-B590-4669-965D-FBE3C6AC3DEC}" v="24" dt="2019-10-02T20:05:36.989"/>
+    <p1510:client id="{2867BBFD-B590-4669-965D-FBE3C6AC3DEC}" v="59" dt="2019-10-05T11:12:28.903"/>
   </p1510:revLst>
 </p1510:revInfo>
 </file>
@@ -136,25 +143,95 @@
 <pc:chgInfo xmlns:a="http://schemas.openxmlformats.org/drawingml/2006/main" xmlns:r="http://schemas.openxmlformats.org/officeDocument/2006/relationships" xmlns:ac="http://schemas.microsoft.com/office/drawing/2013/main/command" xmlns:pc="http://schemas.microsoft.com/office/powerpoint/2013/main/command">
   <pc:docChgLst>
     <pc:chgData name="Barney Lawrence" userId="993b92e47e495d54" providerId="LiveId" clId="{2867BBFD-B590-4669-965D-FBE3C6AC3DEC}"/>
-    <pc:docChg chg="custSel addSld modSld">
-      <pc:chgData name="Barney Lawrence" userId="993b92e47e495d54" providerId="LiveId" clId="{2867BBFD-B590-4669-965D-FBE3C6AC3DEC}" dt="2019-10-02T20:06:01.195" v="169" actId="1076"/>
+    <pc:docChg chg="undo custSel mod addSld modSld sldOrd">
+      <pc:chgData name="Barney Lawrence" userId="993b92e47e495d54" providerId="LiveId" clId="{2867BBFD-B590-4669-965D-FBE3C6AC3DEC}" dt="2019-10-05T11:47:13.316" v="288" actId="478"/>
       <pc:docMkLst>
         <pc:docMk/>
       </pc:docMkLst>
-      <pc:sldChg chg="addSp modSp">
-        <pc:chgData name="Barney Lawrence" userId="993b92e47e495d54" providerId="LiveId" clId="{2867BBFD-B590-4669-965D-FBE3C6AC3DEC}" dt="2019-10-02T20:06:01.195" v="169" actId="1076"/>
+      <pc:sldChg chg="addSp delSp modSp">
+        <pc:chgData name="Barney Lawrence" userId="993b92e47e495d54" providerId="LiveId" clId="{2867BBFD-B590-4669-965D-FBE3C6AC3DEC}" dt="2019-10-03T18:08:09.847" v="207" actId="1076"/>
         <pc:sldMkLst>
           <pc:docMk/>
           <pc:sldMk cId="2778868715" sldId="256"/>
         </pc:sldMkLst>
+        <pc:spChg chg="mod">
+          <ac:chgData name="Barney Lawrence" userId="993b92e47e495d54" providerId="LiveId" clId="{2867BBFD-B590-4669-965D-FBE3C6AC3DEC}" dt="2019-10-03T18:08:09.847" v="207" actId="1076"/>
+          <ac:spMkLst>
+            <pc:docMk/>
+            <pc:sldMk cId="2778868715" sldId="256"/>
+            <ac:spMk id="3" creationId="{D1873E0D-D8D2-4E3F-B93C-8351FFB89810}"/>
+          </ac:spMkLst>
+        </pc:spChg>
+        <pc:spChg chg="add del">
+          <ac:chgData name="Barney Lawrence" userId="993b92e47e495d54" providerId="LiveId" clId="{2867BBFD-B590-4669-965D-FBE3C6AC3DEC}" dt="2019-10-03T18:05:26.987" v="190"/>
+          <ac:spMkLst>
+            <pc:docMk/>
+            <pc:sldMk cId="2778868715" sldId="256"/>
+            <ac:spMk id="5" creationId="{EBAA8964-6C68-45E3-AEE5-62B7C34056FE}"/>
+          </ac:spMkLst>
+        </pc:spChg>
+        <pc:spChg chg="add mod">
+          <ac:chgData name="Barney Lawrence" userId="993b92e47e495d54" providerId="LiveId" clId="{2867BBFD-B590-4669-965D-FBE3C6AC3DEC}" dt="2019-10-03T18:07:00.530" v="202" actId="14100"/>
+          <ac:spMkLst>
+            <pc:docMk/>
+            <pc:sldMk cId="2778868715" sldId="256"/>
+            <ac:spMk id="6" creationId="{91B37A09-7ED7-4CE2-8DF0-EC4CB7AA59E3}"/>
+          </ac:spMkLst>
+        </pc:spChg>
         <pc:picChg chg="add mod">
-          <ac:chgData name="Barney Lawrence" userId="993b92e47e495d54" providerId="LiveId" clId="{2867BBFD-B590-4669-965D-FBE3C6AC3DEC}" dt="2019-10-02T20:06:01.195" v="169" actId="1076"/>
+          <ac:chgData name="Barney Lawrence" userId="993b92e47e495d54" providerId="LiveId" clId="{2867BBFD-B590-4669-965D-FBE3C6AC3DEC}" dt="2019-10-03T18:06:48.027" v="200" actId="1076"/>
           <ac:picMkLst>
             <pc:docMk/>
             <pc:sldMk cId="2778868715" sldId="256"/>
             <ac:picMk id="4" creationId="{4BE8913A-F9B3-46C9-BB49-0AF66A9BA9FC}"/>
           </ac:picMkLst>
         </pc:picChg>
+      </pc:sldChg>
+      <pc:sldChg chg="delSp modSp">
+        <pc:chgData name="Barney Lawrence" userId="993b92e47e495d54" providerId="LiveId" clId="{2867BBFD-B590-4669-965D-FBE3C6AC3DEC}" dt="2019-10-05T11:46:56.137" v="285" actId="14100"/>
+        <pc:sldMkLst>
+          <pc:docMk/>
+          <pc:sldMk cId="3354740050" sldId="257"/>
+        </pc:sldMkLst>
+        <pc:spChg chg="mod">
+          <ac:chgData name="Barney Lawrence" userId="993b92e47e495d54" providerId="LiveId" clId="{2867BBFD-B590-4669-965D-FBE3C6AC3DEC}" dt="2019-10-05T11:46:56.137" v="285" actId="14100"/>
+          <ac:spMkLst>
+            <pc:docMk/>
+            <pc:sldMk cId="3354740050" sldId="257"/>
+            <ac:spMk id="2" creationId="{B9DA0F08-9297-4D4A-9644-01DF54B4B36D}"/>
+          </ac:spMkLst>
+        </pc:spChg>
+        <pc:spChg chg="del">
+          <ac:chgData name="Barney Lawrence" userId="993b92e47e495d54" providerId="LiveId" clId="{2867BBFD-B590-4669-965D-FBE3C6AC3DEC}" dt="2019-10-05T11:46:45.576" v="283" actId="478"/>
+          <ac:spMkLst>
+            <pc:docMk/>
+            <pc:sldMk cId="3354740050" sldId="257"/>
+            <ac:spMk id="3" creationId="{4A0A431F-A05F-406C-8FE4-2990B9AEBD64}"/>
+          </ac:spMkLst>
+        </pc:spChg>
+      </pc:sldChg>
+      <pc:sldChg chg="delSp modSp">
+        <pc:chgData name="Barney Lawrence" userId="993b92e47e495d54" providerId="LiveId" clId="{2867BBFD-B590-4669-965D-FBE3C6AC3DEC}" dt="2019-10-05T11:47:13.316" v="288" actId="478"/>
+        <pc:sldMkLst>
+          <pc:docMk/>
+          <pc:sldMk cId="3956873113" sldId="258"/>
+        </pc:sldMkLst>
+        <pc:spChg chg="mod">
+          <ac:chgData name="Barney Lawrence" userId="993b92e47e495d54" providerId="LiveId" clId="{2867BBFD-B590-4669-965D-FBE3C6AC3DEC}" dt="2019-10-05T11:47:07.445" v="287" actId="14100"/>
+          <ac:spMkLst>
+            <pc:docMk/>
+            <pc:sldMk cId="3956873113" sldId="258"/>
+            <ac:spMk id="2" creationId="{5D4359BF-42B7-4B78-B7D8-4B8E6ED4FBC7}"/>
+          </ac:spMkLst>
+        </pc:spChg>
+        <pc:spChg chg="del">
+          <ac:chgData name="Barney Lawrence" userId="993b92e47e495d54" providerId="LiveId" clId="{2867BBFD-B590-4669-965D-FBE3C6AC3DEC}" dt="2019-10-05T11:47:13.316" v="288" actId="478"/>
+          <ac:spMkLst>
+            <pc:docMk/>
+            <pc:sldMk cId="3956873113" sldId="258"/>
+            <ac:spMk id="3" creationId="{91D2EB58-66B4-4EB8-AB90-34122619F965}"/>
+          </ac:spMkLst>
+        </pc:spChg>
       </pc:sldChg>
       <pc:sldChg chg="modSp modAnim">
         <pc:chgData name="Barney Lawrence" userId="993b92e47e495d54" providerId="LiveId" clId="{2867BBFD-B590-4669-965D-FBE3C6AC3DEC}" dt="2019-09-23T20:03:18.218" v="4"/>
@@ -186,8 +263,8 @@
           </ac:spMkLst>
         </pc:spChg>
       </pc:sldChg>
-      <pc:sldChg chg="modSp add">
-        <pc:chgData name="Barney Lawrence" userId="993b92e47e495d54" providerId="LiveId" clId="{2867BBFD-B590-4669-965D-FBE3C6AC3DEC}" dt="2019-09-23T20:04:29.548" v="69" actId="20577"/>
+      <pc:sldChg chg="modSp add ord">
+        <pc:chgData name="Barney Lawrence" userId="993b92e47e495d54" providerId="LiveId" clId="{2867BBFD-B590-4669-965D-FBE3C6AC3DEC}" dt="2019-10-05T11:12:28.902" v="282"/>
         <pc:sldMkLst>
           <pc:docMk/>
           <pc:sldMk cId="3528901481" sldId="261"/>
@@ -306,6 +383,343 @@
           </ac:spMkLst>
         </pc:spChg>
       </pc:sldChg>
+      <pc:sldChg chg="addSp delSp modSp add mod setBg">
+        <pc:chgData name="Barney Lawrence" userId="993b92e47e495d54" providerId="LiveId" clId="{2867BBFD-B590-4669-965D-FBE3C6AC3DEC}" dt="2019-10-05T11:00:22.854" v="224" actId="14100"/>
+        <pc:sldMkLst>
+          <pc:docMk/>
+          <pc:sldMk cId="1877771477" sldId="269"/>
+        </pc:sldMkLst>
+        <pc:spChg chg="add del mod">
+          <ac:chgData name="Barney Lawrence" userId="993b92e47e495d54" providerId="LiveId" clId="{2867BBFD-B590-4669-965D-FBE3C6AC3DEC}" dt="2019-10-05T10:58:44.992" v="217" actId="478"/>
+          <ac:spMkLst>
+            <pc:docMk/>
+            <pc:sldMk cId="1877771477" sldId="269"/>
+            <ac:spMk id="2" creationId="{9E1A7AF2-4DB6-4FA9-8533-8C9D680EC699}"/>
+          </ac:spMkLst>
+        </pc:spChg>
+        <pc:spChg chg="del">
+          <ac:chgData name="Barney Lawrence" userId="993b92e47e495d54" providerId="LiveId" clId="{2867BBFD-B590-4669-965D-FBE3C6AC3DEC}" dt="2019-10-05T10:57:53.268" v="209"/>
+          <ac:spMkLst>
+            <pc:docMk/>
+            <pc:sldMk cId="1877771477" sldId="269"/>
+            <ac:spMk id="3" creationId="{5242E5BD-8E21-46F7-B0EC-0074203DE526}"/>
+          </ac:spMkLst>
+        </pc:spChg>
+        <pc:spChg chg="add mod">
+          <ac:chgData name="Barney Lawrence" userId="993b92e47e495d54" providerId="LiveId" clId="{2867BBFD-B590-4669-965D-FBE3C6AC3DEC}" dt="2019-10-05T11:00:22.854" v="224" actId="14100"/>
+          <ac:spMkLst>
+            <pc:docMk/>
+            <pc:sldMk cId="1877771477" sldId="269"/>
+            <ac:spMk id="5" creationId="{45C78777-32F2-4844-971D-7B37535B593E}"/>
+          </ac:spMkLst>
+        </pc:spChg>
+        <pc:spChg chg="add del">
+          <ac:chgData name="Barney Lawrence" userId="993b92e47e495d54" providerId="LiveId" clId="{2867BBFD-B590-4669-965D-FBE3C6AC3DEC}" dt="2019-10-05T10:58:39.160" v="216" actId="26606"/>
+          <ac:spMkLst>
+            <pc:docMk/>
+            <pc:sldMk cId="1877771477" sldId="269"/>
+            <ac:spMk id="8" creationId="{10E66E10-9BDA-4CA4-8693-F6F5B2638CF3}"/>
+          </ac:spMkLst>
+        </pc:spChg>
+        <pc:spChg chg="add del">
+          <ac:chgData name="Barney Lawrence" userId="993b92e47e495d54" providerId="LiveId" clId="{2867BBFD-B590-4669-965D-FBE3C6AC3DEC}" dt="2019-10-05T10:58:39.160" v="216" actId="26606"/>
+          <ac:spMkLst>
+            <pc:docMk/>
+            <pc:sldMk cId="1877771477" sldId="269"/>
+            <ac:spMk id="11" creationId="{D6EA1A26-163F-4F15-91F4-F2C51AC9C106}"/>
+          </ac:spMkLst>
+        </pc:spChg>
+        <pc:picChg chg="add mod">
+          <ac:chgData name="Barney Lawrence" userId="993b92e47e495d54" providerId="LiveId" clId="{2867BBFD-B590-4669-965D-FBE3C6AC3DEC}" dt="2019-10-05T11:00:10.877" v="222" actId="1076"/>
+          <ac:picMkLst>
+            <pc:docMk/>
+            <pc:sldMk cId="1877771477" sldId="269"/>
+            <ac:picMk id="4" creationId="{56CF9C9A-DF38-4DA5-902C-BCFB1594B1EB}"/>
+          </ac:picMkLst>
+        </pc:picChg>
+      </pc:sldChg>
+      <pc:sldChg chg="addSp delSp modSp add">
+        <pc:chgData name="Barney Lawrence" userId="993b92e47e495d54" providerId="LiveId" clId="{2867BBFD-B590-4669-965D-FBE3C6AC3DEC}" dt="2019-10-05T11:02:08.057" v="231" actId="1076"/>
+        <pc:sldMkLst>
+          <pc:docMk/>
+          <pc:sldMk cId="3675734915" sldId="270"/>
+        </pc:sldMkLst>
+        <pc:spChg chg="del">
+          <ac:chgData name="Barney Lawrence" userId="993b92e47e495d54" providerId="LiveId" clId="{2867BBFD-B590-4669-965D-FBE3C6AC3DEC}" dt="2019-10-05T11:01:42.976" v="227" actId="478"/>
+          <ac:spMkLst>
+            <pc:docMk/>
+            <pc:sldMk cId="3675734915" sldId="270"/>
+            <ac:spMk id="2" creationId="{397578CB-0DBD-49D6-BFD8-854EB6A2F372}"/>
+          </ac:spMkLst>
+        </pc:spChg>
+        <pc:spChg chg="del">
+          <ac:chgData name="Barney Lawrence" userId="993b92e47e495d54" providerId="LiveId" clId="{2867BBFD-B590-4669-965D-FBE3C6AC3DEC}" dt="2019-10-05T11:01:38.860" v="226"/>
+          <ac:spMkLst>
+            <pc:docMk/>
+            <pc:sldMk cId="3675734915" sldId="270"/>
+            <ac:spMk id="3" creationId="{5930CF7E-A488-48DB-AE8C-3F607D92FC80}"/>
+          </ac:spMkLst>
+        </pc:spChg>
+        <pc:spChg chg="add mod">
+          <ac:chgData name="Barney Lawrence" userId="993b92e47e495d54" providerId="LiveId" clId="{2867BBFD-B590-4669-965D-FBE3C6AC3DEC}" dt="2019-10-05T11:02:08.057" v="231" actId="1076"/>
+          <ac:spMkLst>
+            <pc:docMk/>
+            <pc:sldMk cId="3675734915" sldId="270"/>
+            <ac:spMk id="5" creationId="{1D6931A2-1D28-409D-80EF-5CD678FC3843}"/>
+          </ac:spMkLst>
+        </pc:spChg>
+        <pc:picChg chg="add mod">
+          <ac:chgData name="Barney Lawrence" userId="993b92e47e495d54" providerId="LiveId" clId="{2867BBFD-B590-4669-965D-FBE3C6AC3DEC}" dt="2019-10-05T11:01:52.732" v="229" actId="14100"/>
+          <ac:picMkLst>
+            <pc:docMk/>
+            <pc:sldMk cId="3675734915" sldId="270"/>
+            <ac:picMk id="4" creationId="{E207DF32-7438-40EC-B297-A99BBE357710}"/>
+          </ac:picMkLst>
+        </pc:picChg>
+      </pc:sldChg>
+      <pc:sldChg chg="addSp delSp modSp add">
+        <pc:chgData name="Barney Lawrence" userId="993b92e47e495d54" providerId="LiveId" clId="{2867BBFD-B590-4669-965D-FBE3C6AC3DEC}" dt="2019-10-05T11:03:23.336" v="241" actId="1076"/>
+        <pc:sldMkLst>
+          <pc:docMk/>
+          <pc:sldMk cId="2615885262" sldId="271"/>
+        </pc:sldMkLst>
+        <pc:spChg chg="del">
+          <ac:chgData name="Barney Lawrence" userId="993b92e47e495d54" providerId="LiveId" clId="{2867BBFD-B590-4669-965D-FBE3C6AC3DEC}" dt="2019-10-05T11:02:57.806" v="237" actId="478"/>
+          <ac:spMkLst>
+            <pc:docMk/>
+            <pc:sldMk cId="2615885262" sldId="271"/>
+            <ac:spMk id="2" creationId="{DA56ACF3-4416-4967-BCFD-F4312A1CF443}"/>
+          </ac:spMkLst>
+        </pc:spChg>
+        <pc:spChg chg="del">
+          <ac:chgData name="Barney Lawrence" userId="993b92e47e495d54" providerId="LiveId" clId="{2867BBFD-B590-4669-965D-FBE3C6AC3DEC}" dt="2019-10-05T11:02:53.431" v="236"/>
+          <ac:spMkLst>
+            <pc:docMk/>
+            <pc:sldMk cId="2615885262" sldId="271"/>
+            <ac:spMk id="3" creationId="{74F94224-2A1A-4559-8783-09F6F47609B1}"/>
+          </ac:spMkLst>
+        </pc:spChg>
+        <pc:spChg chg="add mod">
+          <ac:chgData name="Barney Lawrence" userId="993b92e47e495d54" providerId="LiveId" clId="{2867BBFD-B590-4669-965D-FBE3C6AC3DEC}" dt="2019-10-05T11:03:23.336" v="241" actId="1076"/>
+          <ac:spMkLst>
+            <pc:docMk/>
+            <pc:sldMk cId="2615885262" sldId="271"/>
+            <ac:spMk id="5" creationId="{B1583507-ECEA-4DFF-9E0E-D50FF968D2C3}"/>
+          </ac:spMkLst>
+        </pc:spChg>
+        <pc:picChg chg="add mod">
+          <ac:chgData name="Barney Lawrence" userId="993b92e47e495d54" providerId="LiveId" clId="{2867BBFD-B590-4669-965D-FBE3C6AC3DEC}" dt="2019-10-05T11:03:07.553" v="239" actId="14100"/>
+          <ac:picMkLst>
+            <pc:docMk/>
+            <pc:sldMk cId="2615885262" sldId="271"/>
+            <ac:picMk id="4" creationId="{11D88558-1DC5-4B10-8EF0-CDB59F2F51B6}"/>
+          </ac:picMkLst>
+        </pc:picChg>
+      </pc:sldChg>
+      <pc:sldChg chg="addSp delSp modSp add">
+        <pc:chgData name="Barney Lawrence" userId="993b92e47e495d54" providerId="LiveId" clId="{2867BBFD-B590-4669-965D-FBE3C6AC3DEC}" dt="2019-10-05T11:05:49.851" v="255" actId="1076"/>
+        <pc:sldMkLst>
+          <pc:docMk/>
+          <pc:sldMk cId="122906651" sldId="272"/>
+        </pc:sldMkLst>
+        <pc:spChg chg="del">
+          <ac:chgData name="Barney Lawrence" userId="993b92e47e495d54" providerId="LiveId" clId="{2867BBFD-B590-4669-965D-FBE3C6AC3DEC}" dt="2019-10-05T11:04:47.959" v="243" actId="478"/>
+          <ac:spMkLst>
+            <pc:docMk/>
+            <pc:sldMk cId="122906651" sldId="272"/>
+            <ac:spMk id="2" creationId="{92014D71-A9BB-4938-9756-AA5AA9CC2B1C}"/>
+          </ac:spMkLst>
+        </pc:spChg>
+        <pc:spChg chg="del">
+          <ac:chgData name="Barney Lawrence" userId="993b92e47e495d54" providerId="LiveId" clId="{2867BBFD-B590-4669-965D-FBE3C6AC3DEC}" dt="2019-10-05T11:04:44.329" v="242"/>
+          <ac:spMkLst>
+            <pc:docMk/>
+            <pc:sldMk cId="122906651" sldId="272"/>
+            <ac:spMk id="3" creationId="{68145508-2B41-4B2C-925C-0372D507F56E}"/>
+          </ac:spMkLst>
+        </pc:spChg>
+        <pc:spChg chg="add mod">
+          <ac:chgData name="Barney Lawrence" userId="993b92e47e495d54" providerId="LiveId" clId="{2867BBFD-B590-4669-965D-FBE3C6AC3DEC}" dt="2019-10-05T11:05:49.851" v="255" actId="1076"/>
+          <ac:spMkLst>
+            <pc:docMk/>
+            <pc:sldMk cId="122906651" sldId="272"/>
+            <ac:spMk id="5" creationId="{DE56B7BC-3096-4DD6-91C6-A3C0B88F2CEF}"/>
+          </ac:spMkLst>
+        </pc:spChg>
+        <pc:spChg chg="add mod">
+          <ac:chgData name="Barney Lawrence" userId="993b92e47e495d54" providerId="LiveId" clId="{2867BBFD-B590-4669-965D-FBE3C6AC3DEC}" dt="2019-10-05T11:05:40.651" v="254" actId="1076"/>
+          <ac:spMkLst>
+            <pc:docMk/>
+            <pc:sldMk cId="122906651" sldId="272"/>
+            <ac:spMk id="6" creationId="{30227E88-5E8F-4E27-92D1-808D6940104F}"/>
+          </ac:spMkLst>
+        </pc:spChg>
+        <pc:spChg chg="add mod">
+          <ac:chgData name="Barney Lawrence" userId="993b92e47e495d54" providerId="LiveId" clId="{2867BBFD-B590-4669-965D-FBE3C6AC3DEC}" dt="2019-10-05T11:05:34.059" v="253" actId="1076"/>
+          <ac:spMkLst>
+            <pc:docMk/>
+            <pc:sldMk cId="122906651" sldId="272"/>
+            <ac:spMk id="7" creationId="{6A806346-3673-42DB-8C66-114026302EAA}"/>
+          </ac:spMkLst>
+        </pc:spChg>
+        <pc:spChg chg="add mod">
+          <ac:chgData name="Barney Lawrence" userId="993b92e47e495d54" providerId="LiveId" clId="{2867BBFD-B590-4669-965D-FBE3C6AC3DEC}" dt="2019-10-05T11:05:28.419" v="252" actId="1076"/>
+          <ac:spMkLst>
+            <pc:docMk/>
+            <pc:sldMk cId="122906651" sldId="272"/>
+            <ac:spMk id="8" creationId="{19BFD65D-73D6-4341-91D5-48C912FCCFBE}"/>
+          </ac:spMkLst>
+        </pc:spChg>
+        <pc:picChg chg="add mod">
+          <ac:chgData name="Barney Lawrence" userId="993b92e47e495d54" providerId="LiveId" clId="{2867BBFD-B590-4669-965D-FBE3C6AC3DEC}" dt="2019-10-05T11:05:12.982" v="247" actId="1076"/>
+          <ac:picMkLst>
+            <pc:docMk/>
+            <pc:sldMk cId="122906651" sldId="272"/>
+            <ac:picMk id="4" creationId="{78BFB897-ACBB-4CBA-8B04-A7B6A2DA867D}"/>
+          </ac:picMkLst>
+        </pc:picChg>
+      </pc:sldChg>
+      <pc:sldChg chg="addSp delSp modSp add">
+        <pc:chgData name="Barney Lawrence" userId="993b92e47e495d54" providerId="LiveId" clId="{2867BBFD-B590-4669-965D-FBE3C6AC3DEC}" dt="2019-10-05T11:08:26.959" v="265" actId="14100"/>
+        <pc:sldMkLst>
+          <pc:docMk/>
+          <pc:sldMk cId="2870919643" sldId="273"/>
+        </pc:sldMkLst>
+        <pc:spChg chg="del">
+          <ac:chgData name="Barney Lawrence" userId="993b92e47e495d54" providerId="LiveId" clId="{2867BBFD-B590-4669-965D-FBE3C6AC3DEC}" dt="2019-10-05T11:07:28.642" v="257" actId="478"/>
+          <ac:spMkLst>
+            <pc:docMk/>
+            <pc:sldMk cId="2870919643" sldId="273"/>
+            <ac:spMk id="2" creationId="{C96C9401-4970-4F7E-B9AE-D4BEC00569A6}"/>
+          </ac:spMkLst>
+        </pc:spChg>
+        <pc:spChg chg="del">
+          <ac:chgData name="Barney Lawrence" userId="993b92e47e495d54" providerId="LiveId" clId="{2867BBFD-B590-4669-965D-FBE3C6AC3DEC}" dt="2019-10-05T11:07:24.371" v="256"/>
+          <ac:spMkLst>
+            <pc:docMk/>
+            <pc:sldMk cId="2870919643" sldId="273"/>
+            <ac:spMk id="3" creationId="{135E70CF-8133-444C-B24D-5AE8E43912F0}"/>
+          </ac:spMkLst>
+        </pc:spChg>
+        <pc:spChg chg="add mod">
+          <ac:chgData name="Barney Lawrence" userId="993b92e47e495d54" providerId="LiveId" clId="{2867BBFD-B590-4669-965D-FBE3C6AC3DEC}" dt="2019-10-05T11:08:26.959" v="265" actId="14100"/>
+          <ac:spMkLst>
+            <pc:docMk/>
+            <pc:sldMk cId="2870919643" sldId="273"/>
+            <ac:spMk id="5" creationId="{1AE38C29-8A41-4493-8BC5-1F5FA988EEB6}"/>
+          </ac:spMkLst>
+        </pc:spChg>
+        <pc:spChg chg="add mod">
+          <ac:chgData name="Barney Lawrence" userId="993b92e47e495d54" providerId="LiveId" clId="{2867BBFD-B590-4669-965D-FBE3C6AC3DEC}" dt="2019-10-05T11:08:02.082" v="261" actId="11529"/>
+          <ac:spMkLst>
+            <pc:docMk/>
+            <pc:sldMk cId="2870919643" sldId="273"/>
+            <ac:spMk id="6" creationId="{7BA68199-77D2-4D93-8242-F0A49A9341F8}"/>
+          </ac:spMkLst>
+        </pc:spChg>
+        <pc:spChg chg="add mod">
+          <ac:chgData name="Barney Lawrence" userId="993b92e47e495d54" providerId="LiveId" clId="{2867BBFD-B590-4669-965D-FBE3C6AC3DEC}" dt="2019-10-05T11:08:23.277" v="264" actId="11529"/>
+          <ac:spMkLst>
+            <pc:docMk/>
+            <pc:sldMk cId="2870919643" sldId="273"/>
+            <ac:spMk id="7" creationId="{8DF37701-33A3-4699-9BB6-3F967E64B2A0}"/>
+          </ac:spMkLst>
+        </pc:spChg>
+        <pc:picChg chg="add mod">
+          <ac:chgData name="Barney Lawrence" userId="993b92e47e495d54" providerId="LiveId" clId="{2867BBFD-B590-4669-965D-FBE3C6AC3DEC}" dt="2019-10-05T11:08:08.907" v="263" actId="1076"/>
+          <ac:picMkLst>
+            <pc:docMk/>
+            <pc:sldMk cId="2870919643" sldId="273"/>
+            <ac:picMk id="4" creationId="{E95A1853-66F8-4F50-BBF6-3BBDFEA68ADE}"/>
+          </ac:picMkLst>
+        </pc:picChg>
+      </pc:sldChg>
+      <pc:sldChg chg="addSp delSp modSp add">
+        <pc:chgData name="Barney Lawrence" userId="993b92e47e495d54" providerId="LiveId" clId="{2867BBFD-B590-4669-965D-FBE3C6AC3DEC}" dt="2019-10-05T11:10:03.562" v="273" actId="1076"/>
+        <pc:sldMkLst>
+          <pc:docMk/>
+          <pc:sldMk cId="1980731210" sldId="274"/>
+        </pc:sldMkLst>
+        <pc:spChg chg="del">
+          <ac:chgData name="Barney Lawrence" userId="993b92e47e495d54" providerId="LiveId" clId="{2867BBFD-B590-4669-965D-FBE3C6AC3DEC}" dt="2019-10-05T11:09:32.371" v="267" actId="478"/>
+          <ac:spMkLst>
+            <pc:docMk/>
+            <pc:sldMk cId="1980731210" sldId="274"/>
+            <ac:spMk id="2" creationId="{BA67EE7E-6EA7-41F4-B9A3-4C8AA7CF984F}"/>
+          </ac:spMkLst>
+        </pc:spChg>
+        <pc:spChg chg="del">
+          <ac:chgData name="Barney Lawrence" userId="993b92e47e495d54" providerId="LiveId" clId="{2867BBFD-B590-4669-965D-FBE3C6AC3DEC}" dt="2019-10-05T11:09:26.945" v="266"/>
+          <ac:spMkLst>
+            <pc:docMk/>
+            <pc:sldMk cId="1980731210" sldId="274"/>
+            <ac:spMk id="3" creationId="{A9C276E9-EA57-40F6-B8E6-E91BD57E9F3F}"/>
+          </ac:spMkLst>
+        </pc:spChg>
+        <pc:spChg chg="add mod">
+          <ac:chgData name="Barney Lawrence" userId="993b92e47e495d54" providerId="LiveId" clId="{2867BBFD-B590-4669-965D-FBE3C6AC3DEC}" dt="2019-10-05T11:10:03.562" v="273" actId="1076"/>
+          <ac:spMkLst>
+            <pc:docMk/>
+            <pc:sldMk cId="1980731210" sldId="274"/>
+            <ac:spMk id="5" creationId="{B242D611-5DE5-494A-AA92-EB82DEC97080}"/>
+          </ac:spMkLst>
+        </pc:spChg>
+        <pc:picChg chg="add mod">
+          <ac:chgData name="Barney Lawrence" userId="993b92e47e495d54" providerId="LiveId" clId="{2867BBFD-B590-4669-965D-FBE3C6AC3DEC}" dt="2019-10-05T11:09:58.859" v="272" actId="1076"/>
+          <ac:picMkLst>
+            <pc:docMk/>
+            <pc:sldMk cId="1980731210" sldId="274"/>
+            <ac:picMk id="4" creationId="{14DC487F-23E0-45ED-936C-2D548CCF18F6}"/>
+          </ac:picMkLst>
+        </pc:picChg>
+      </pc:sldChg>
+      <pc:sldChg chg="addSp delSp modSp add">
+        <pc:chgData name="Barney Lawrence" userId="993b92e47e495d54" providerId="LiveId" clId="{2867BBFD-B590-4669-965D-FBE3C6AC3DEC}" dt="2019-10-05T11:12:10.311" v="281" actId="1076"/>
+        <pc:sldMkLst>
+          <pc:docMk/>
+          <pc:sldMk cId="815898707" sldId="275"/>
+        </pc:sldMkLst>
+        <pc:spChg chg="del">
+          <ac:chgData name="Barney Lawrence" userId="993b92e47e495d54" providerId="LiveId" clId="{2867BBFD-B590-4669-965D-FBE3C6AC3DEC}" dt="2019-10-05T11:11:37.824" v="276" actId="478"/>
+          <ac:spMkLst>
+            <pc:docMk/>
+            <pc:sldMk cId="815898707" sldId="275"/>
+            <ac:spMk id="2" creationId="{F1461CA0-BFEF-41E7-8389-D002316ED1A2}"/>
+          </ac:spMkLst>
+        </pc:spChg>
+        <pc:spChg chg="del">
+          <ac:chgData name="Barney Lawrence" userId="993b92e47e495d54" providerId="LiveId" clId="{2867BBFD-B590-4669-965D-FBE3C6AC3DEC}" dt="2019-10-05T11:11:34.384" v="275"/>
+          <ac:spMkLst>
+            <pc:docMk/>
+            <pc:sldMk cId="815898707" sldId="275"/>
+            <ac:spMk id="3" creationId="{FDC4AFCE-6051-498C-AC78-E257648210CE}"/>
+          </ac:spMkLst>
+        </pc:spChg>
+        <pc:spChg chg="add mod">
+          <ac:chgData name="Barney Lawrence" userId="993b92e47e495d54" providerId="LiveId" clId="{2867BBFD-B590-4669-965D-FBE3C6AC3DEC}" dt="2019-10-05T11:12:00.194" v="279" actId="11529"/>
+          <ac:spMkLst>
+            <pc:docMk/>
+            <pc:sldMk cId="815898707" sldId="275"/>
+            <ac:spMk id="5" creationId="{A063BA35-FC74-4FC6-B21C-F9142D2140E5}"/>
+          </ac:spMkLst>
+        </pc:spChg>
+        <pc:spChg chg="add mod">
+          <ac:chgData name="Barney Lawrence" userId="993b92e47e495d54" providerId="LiveId" clId="{2867BBFD-B590-4669-965D-FBE3C6AC3DEC}" dt="2019-10-05T11:12:10.311" v="281" actId="1076"/>
+          <ac:spMkLst>
+            <pc:docMk/>
+            <pc:sldMk cId="815898707" sldId="275"/>
+            <ac:spMk id="6" creationId="{A2C6F5BD-A5E6-4CA6-812B-2BE51E62299C}"/>
+          </ac:spMkLst>
+        </pc:spChg>
+        <pc:picChg chg="add mod">
+          <ac:chgData name="Barney Lawrence" userId="993b92e47e495d54" providerId="LiveId" clId="{2867BBFD-B590-4669-965D-FBE3C6AC3DEC}" dt="2019-10-05T11:11:48.617" v="278" actId="14100"/>
+          <ac:picMkLst>
+            <pc:docMk/>
+            <pc:sldMk cId="815898707" sldId="275"/>
+            <ac:picMk id="4" creationId="{8B2454C7-8D2A-46C6-AF59-D5D28CBFC449}"/>
+          </ac:picMkLst>
+        </pc:picChg>
+      </pc:sldChg>
     </pc:docChg>
   </pc:docChgLst>
 </pc:chgInfo>
@@ -512,7 +926,7 @@
             <a:fld id="{5586B75A-687E-405C-8A0B-8D00578BA2C3}" type="datetimeFigureOut">
               <a:rPr lang="en-US" dirty="0"/>
               <a:pPr/>
-              <a:t>10/2/2019</a:t>
+              <a:t>10/4/2019</a:t>
             </a:fld>
             <a:endParaRPr lang="en-US" dirty="0"/>
           </a:p>
@@ -698,7 +1112,7 @@
           <a:p>
             <a:fld id="{5F4E5243-F52A-4D37-9694-EB26C6C31910}" type="datetimeFigureOut">
               <a:rPr lang="en-US" dirty="0"/>
-              <a:t>10/2/2019</a:t>
+              <a:t>10/4/2019</a:t>
             </a:fld>
             <a:endParaRPr lang="en-US" dirty="0"/>
           </a:p>
@@ -873,7 +1287,7 @@
           <a:p>
             <a:fld id="{3A77B6E1-634A-48DC-9E8B-D894023267EF}" type="datetimeFigureOut">
               <a:rPr lang="en-US" dirty="0"/>
-              <a:t>10/2/2019</a:t>
+              <a:t>10/4/2019</a:t>
             </a:fld>
             <a:endParaRPr lang="en-US" dirty="0"/>
           </a:p>
@@ -1038,7 +1452,7 @@
           <a:p>
             <a:fld id="{7B2D3E9E-A95C-48F2-B4BF-A71542E0BE9A}" type="datetimeFigureOut">
               <a:rPr lang="en-US" dirty="0"/>
-              <a:t>10/2/2019</a:t>
+              <a:t>10/4/2019</a:t>
             </a:fld>
             <a:endParaRPr lang="en-US" dirty="0"/>
           </a:p>
@@ -1290,7 +1704,7 @@
             <a:fld id="{5586B75A-687E-405C-8A0B-8D00578BA2C3}" type="datetimeFigureOut">
               <a:rPr lang="en-US" dirty="0"/>
               <a:pPr/>
-              <a:t>10/2/2019</a:t>
+              <a:t>10/4/2019</a:t>
             </a:fld>
             <a:endParaRPr lang="en-US" dirty="0"/>
           </a:p>
@@ -1574,7 +1988,7 @@
           <a:p>
             <a:fld id="{F12952B5-7A2F-4CC8-B7CE-9234E21C2837}" type="datetimeFigureOut">
               <a:rPr lang="en-US" dirty="0"/>
-              <a:t>10/2/2019</a:t>
+              <a:t>10/4/2019</a:t>
             </a:fld>
             <a:endParaRPr lang="en-US" dirty="0"/>
           </a:p>
@@ -2007,7 +2421,7 @@
           <a:p>
             <a:fld id="{CE1DA07A-9201-4B4B-BAF2-015AFA30F520}" type="datetimeFigureOut">
               <a:rPr lang="en-US" dirty="0"/>
-              <a:t>10/2/2019</a:t>
+              <a:t>10/4/2019</a:t>
             </a:fld>
             <a:endParaRPr lang="en-US" dirty="0"/>
           </a:p>
@@ -2120,7 +2534,7 @@
           <a:p>
             <a:fld id="{73D7E00A-486F-4252-8B1D-E32645521F49}" type="datetimeFigureOut">
               <a:rPr lang="en-US" dirty="0"/>
-              <a:t>10/2/2019</a:t>
+              <a:t>10/4/2019</a:t>
             </a:fld>
             <a:endParaRPr lang="en-US" dirty="0"/>
           </a:p>
@@ -2210,7 +2624,7 @@
           <a:p>
             <a:fld id="{8DDF5F92-E675-4B36-9A60-69A962A68675}" type="datetimeFigureOut">
               <a:rPr lang="en-US" dirty="0"/>
-              <a:t>10/2/2019</a:t>
+              <a:t>10/4/2019</a:t>
             </a:fld>
             <a:endParaRPr lang="en-US" dirty="0"/>
           </a:p>
@@ -2561,7 +2975,7 @@
           <a:p>
             <a:fld id="{AF6E2C9B-5FA2-460D-9BE7-B0812FC2A6FF}" type="datetimeFigureOut">
               <a:rPr lang="en-US" dirty="0"/>
-              <a:t>10/2/2019</a:t>
+              <a:t>10/4/2019</a:t>
             </a:fld>
             <a:endParaRPr lang="en-US" dirty="0"/>
           </a:p>
@@ -2874,7 +3288,7 @@
             <a:fld id="{5586B75A-687E-405C-8A0B-8D00578BA2C3}" type="datetimeFigureOut">
               <a:rPr lang="en-US" dirty="0"/>
               <a:pPr/>
-              <a:t>10/2/2019</a:t>
+              <a:t>10/4/2019</a:t>
             </a:fld>
             <a:endParaRPr lang="en-US" dirty="0"/>
           </a:p>
@@ -3104,7 +3518,7 @@
             <a:fld id="{5586B75A-687E-405C-8A0B-8D00578BA2C3}" type="datetimeFigureOut">
               <a:rPr lang="en-US" dirty="0"/>
               <a:pPr/>
-              <a:t>10/2/2019</a:t>
+              <a:t>10/4/2019</a:t>
             </a:fld>
             <a:endParaRPr lang="en-US" dirty="0"/>
           </a:p>
@@ -3590,15 +4004,36 @@
             <p:ph type="subTitle" idx="1"/>
           </p:nvPr>
         </p:nvSpPr>
-        <p:spPr/>
-        <p:txBody>
-          <a:bodyPr/>
-          <a:lstStyle/>
-          <a:p>
-            <a:r>
-              <a:rPr lang="en-GB" dirty="0"/>
+        <p:spPr>
+          <a:xfrm>
+            <a:off x="603504" y="3300307"/>
+            <a:ext cx="3294888" cy="1645920"/>
+          </a:xfrm>
+        </p:spPr>
+        <p:txBody>
+          <a:bodyPr>
+            <a:normAutofit lnSpcReduction="10000"/>
+          </a:bodyPr>
+          <a:lstStyle/>
+          <a:p>
+            <a:r>
+              <a:rPr lang="en-GB" b="1" dirty="0"/>
               <a:t>Barney Lawrence</a:t>
             </a:r>
+          </a:p>
+          <a:p>
+            <a:endParaRPr lang="en-GB" b="1" dirty="0"/>
+          </a:p>
+          <a:p>
+            <a:r>
+              <a:rPr lang="en-GB" b="1" dirty="0"/>
+              <a:t>@</a:t>
+            </a:r>
+            <a:r>
+              <a:rPr lang="en-GB" b="1" dirty="0" err="1"/>
+              <a:t>SQLBarney</a:t>
+            </a:r>
+            <a:endParaRPr lang="en-GB" b="1" dirty="0"/>
           </a:p>
         </p:txBody>
       </p:sp>
@@ -3624,7 +4059,7 @@
         </p:blipFill>
         <p:spPr>
           <a:xfrm>
-            <a:off x="9004598" y="3648891"/>
+            <a:off x="9538299" y="4252269"/>
             <a:ext cx="2342681" cy="2357323"/>
           </a:xfrm>
           <a:prstGeom prst="rect">
@@ -3632,6 +4067,54 @@
           </a:prstGeom>
         </p:spPr>
       </p:pic>
+      <p:sp>
+        <p:nvSpPr>
+          <p:cNvPr id="6" name="Rectangle 5">
+            <a:extLst>
+              <a:ext uri="{FF2B5EF4-FFF2-40B4-BE49-F238E27FC236}">
+                <a16:creationId xmlns:a16="http://schemas.microsoft.com/office/drawing/2014/main" id="{91B37A09-7ED7-4CE2-8DF0-EC4CB7AA59E3}"/>
+              </a:ext>
+            </a:extLst>
+          </p:cNvPr>
+          <p:cNvSpPr/>
+          <p:nvPr/>
+        </p:nvSpPr>
+        <p:spPr>
+          <a:xfrm>
+            <a:off x="7402287" y="3033757"/>
+            <a:ext cx="4643664" cy="830997"/>
+          </a:xfrm>
+          <a:prstGeom prst="rect">
+            <a:avLst/>
+          </a:prstGeom>
+        </p:spPr>
+        <p:txBody>
+          <a:bodyPr wrap="square">
+            <a:spAutoFit/>
+          </a:bodyPr>
+          <a:lstStyle/>
+          <a:p>
+            <a:r>
+              <a:rPr lang="en-GB" sz="2400" b="1" dirty="0">
+                <a:solidFill>
+                  <a:schemeClr val="bg1"/>
+                </a:solidFill>
+              </a:rPr>
+              <a:t>https://github.com/BarneyLawrence</a:t>
+            </a:r>
+          </a:p>
+          <a:p>
+            <a:r>
+              <a:rPr lang="en-GB" sz="2400" b="1" dirty="0">
+                <a:solidFill>
+                  <a:schemeClr val="bg1"/>
+                </a:solidFill>
+              </a:rPr>
+              <a:t>/Sessions-TSQL-BeyondTheBasics</a:t>
+            </a:r>
+          </a:p>
+        </p:txBody>
+      </p:sp>
     </p:spTree>
     <p:extLst>
       <p:ext uri="{BB962C8B-B14F-4D97-AF65-F5344CB8AC3E}">
@@ -3662,55 +4145,172 @@
           <a:chExt cx="0" cy="0"/>
         </a:xfrm>
       </p:grpSpPr>
-      <p:sp>
-        <p:nvSpPr>
-          <p:cNvPr id="2" name="Title 1">
+      <p:pic>
+        <p:nvPicPr>
+          <p:cNvPr id="4" name="Content Placeholder 3">
             <a:extLst>
               <a:ext uri="{FF2B5EF4-FFF2-40B4-BE49-F238E27FC236}">
-                <a16:creationId xmlns:a16="http://schemas.microsoft.com/office/drawing/2014/main" id="{84B8720E-DDC4-460F-A7A9-C68BA31FEAA5}"/>
+                <a16:creationId xmlns:a16="http://schemas.microsoft.com/office/drawing/2014/main" id="{E95A1853-66F8-4F50-BBF6-3BBDFEA68ADE}"/>
               </a:ext>
             </a:extLst>
           </p:cNvPr>
-          <p:cNvSpPr>
-            <a:spLocks noGrp="1"/>
-          </p:cNvSpPr>
-          <p:nvPr>
-            <p:ph type="title"/>
-          </p:nvPr>
-        </p:nvSpPr>
-        <p:spPr/>
-        <p:txBody>
-          <a:bodyPr/>
-          <a:lstStyle/>
-          <a:p>
-            <a:r>
-              <a:rPr lang="en-GB" dirty="0"/>
-              <a:t>Window Functions</a:t>
-            </a:r>
-          </a:p>
-        </p:txBody>
-      </p:sp>
-      <p:sp>
-        <p:nvSpPr>
-          <p:cNvPr id="3" name="Content Placeholder 2">
+          <p:cNvPicPr>
+            <a:picLocks noGrp="1" noChangeAspect="1"/>
+          </p:cNvPicPr>
+          <p:nvPr>
+            <p:ph idx="1"/>
+          </p:nvPr>
+        </p:nvPicPr>
+        <p:blipFill>
+          <a:blip r:embed="rId2"/>
+          <a:stretch>
+            <a:fillRect/>
+          </a:stretch>
+        </p:blipFill>
+        <p:spPr>
+          <a:xfrm>
+            <a:off x="96741" y="111710"/>
+            <a:ext cx="10659382" cy="6509807"/>
+          </a:xfrm>
+          <a:prstGeom prst="rect">
+            <a:avLst/>
+          </a:prstGeom>
+        </p:spPr>
+      </p:pic>
+      <p:sp>
+        <p:nvSpPr>
+          <p:cNvPr id="5" name="Arrow: Left 4">
             <a:extLst>
               <a:ext uri="{FF2B5EF4-FFF2-40B4-BE49-F238E27FC236}">
-                <a16:creationId xmlns:a16="http://schemas.microsoft.com/office/drawing/2014/main" id="{0E8B31F7-7A40-47F1-A123-C59ED07E9E3A}"/>
+                <a16:creationId xmlns:a16="http://schemas.microsoft.com/office/drawing/2014/main" id="{1AE38C29-8A41-4493-8BC5-1F5FA988EEB6}"/>
               </a:ext>
             </a:extLst>
           </p:cNvPr>
-          <p:cNvSpPr>
-            <a:spLocks noGrp="1"/>
-          </p:cNvSpPr>
-          <p:nvPr>
-            <p:ph idx="1"/>
-          </p:nvPr>
-        </p:nvSpPr>
-        <p:spPr/>
-        <p:txBody>
-          <a:bodyPr/>
-          <a:lstStyle/>
-          <a:p>
+          <p:cNvSpPr/>
+          <p:nvPr/>
+        </p:nvSpPr>
+        <p:spPr>
+          <a:xfrm>
+            <a:off x="6900792" y="1698171"/>
+            <a:ext cx="4562159" cy="378373"/>
+          </a:xfrm>
+          <a:prstGeom prst="leftArrow">
+            <a:avLst/>
+          </a:prstGeom>
+        </p:spPr>
+        <p:style>
+          <a:lnRef idx="2">
+            <a:schemeClr val="accent1">
+              <a:shade val="50000"/>
+            </a:schemeClr>
+          </a:lnRef>
+          <a:fillRef idx="1">
+            <a:schemeClr val="accent1"/>
+          </a:fillRef>
+          <a:effectRef idx="0">
+            <a:schemeClr val="accent1"/>
+          </a:effectRef>
+          <a:fontRef idx="minor">
+            <a:schemeClr val="lt1"/>
+          </a:fontRef>
+        </p:style>
+        <p:txBody>
+          <a:bodyPr rtlCol="0" anchor="ctr"/>
+          <a:lstStyle/>
+          <a:p>
+            <a:pPr algn="ctr"/>
+            <a:endParaRPr lang="en-GB"/>
+          </a:p>
+        </p:txBody>
+      </p:sp>
+      <p:sp>
+        <p:nvSpPr>
+          <p:cNvPr id="6" name="Arrow: Left 5">
+            <a:extLst>
+              <a:ext uri="{FF2B5EF4-FFF2-40B4-BE49-F238E27FC236}">
+                <a16:creationId xmlns:a16="http://schemas.microsoft.com/office/drawing/2014/main" id="{7BA68199-77D2-4D93-8242-F0A49A9341F8}"/>
+              </a:ext>
+            </a:extLst>
+          </p:cNvPr>
+          <p:cNvSpPr/>
+          <p:nvPr/>
+        </p:nvSpPr>
+        <p:spPr>
+          <a:xfrm>
+            <a:off x="7751805" y="4382530"/>
+            <a:ext cx="3711146" cy="329513"/>
+          </a:xfrm>
+          <a:prstGeom prst="leftArrow">
+            <a:avLst/>
+          </a:prstGeom>
+        </p:spPr>
+        <p:style>
+          <a:lnRef idx="2">
+            <a:schemeClr val="accent1">
+              <a:shade val="50000"/>
+            </a:schemeClr>
+          </a:lnRef>
+          <a:fillRef idx="1">
+            <a:schemeClr val="accent1"/>
+          </a:fillRef>
+          <a:effectRef idx="0">
+            <a:schemeClr val="accent1"/>
+          </a:effectRef>
+          <a:fontRef idx="minor">
+            <a:schemeClr val="lt1"/>
+          </a:fontRef>
+        </p:style>
+        <p:txBody>
+          <a:bodyPr rtlCol="0" anchor="ctr"/>
+          <a:lstStyle/>
+          <a:p>
+            <a:pPr algn="ctr"/>
+            <a:endParaRPr lang="en-GB"/>
+          </a:p>
+        </p:txBody>
+      </p:sp>
+      <p:sp>
+        <p:nvSpPr>
+          <p:cNvPr id="7" name="Arrow: Left 6">
+            <a:extLst>
+              <a:ext uri="{FF2B5EF4-FFF2-40B4-BE49-F238E27FC236}">
+                <a16:creationId xmlns:a16="http://schemas.microsoft.com/office/drawing/2014/main" id="{8DF37701-33A3-4699-9BB6-3F967E64B2A0}"/>
+              </a:ext>
+            </a:extLst>
+          </p:cNvPr>
+          <p:cNvSpPr/>
+          <p:nvPr/>
+        </p:nvSpPr>
+        <p:spPr>
+          <a:xfrm>
+            <a:off x="7208108" y="2615514"/>
+            <a:ext cx="4254843" cy="329513"/>
+          </a:xfrm>
+          <a:prstGeom prst="leftArrow">
+            <a:avLst/>
+          </a:prstGeom>
+        </p:spPr>
+        <p:style>
+          <a:lnRef idx="2">
+            <a:schemeClr val="accent1">
+              <a:shade val="50000"/>
+            </a:schemeClr>
+          </a:lnRef>
+          <a:fillRef idx="1">
+            <a:schemeClr val="accent1"/>
+          </a:fillRef>
+          <a:effectRef idx="0">
+            <a:schemeClr val="accent1"/>
+          </a:effectRef>
+          <a:fontRef idx="minor">
+            <a:schemeClr val="lt1"/>
+          </a:fontRef>
+        </p:style>
+        <p:txBody>
+          <a:bodyPr rtlCol="0" anchor="ctr"/>
+          <a:lstStyle/>
+          <a:p>
+            <a:pPr algn="ctr"/>
             <a:endParaRPr lang="en-GB"/>
           </a:p>
         </p:txBody>
@@ -3718,7 +4318,7 @@
     </p:spTree>
     <p:extLst>
       <p:ext uri="{BB962C8B-B14F-4D97-AF65-F5344CB8AC3E}">
-        <p14:creationId xmlns:p14="http://schemas.microsoft.com/office/powerpoint/2010/main" val="2340967242"/>
+        <p14:creationId xmlns:p14="http://schemas.microsoft.com/office/powerpoint/2010/main" val="2870919643"/>
       </p:ext>
     </p:extLst>
   </p:cSld>
@@ -3745,55 +4345,80 @@
           <a:chExt cx="0" cy="0"/>
         </a:xfrm>
       </p:grpSpPr>
-      <p:sp>
-        <p:nvSpPr>
-          <p:cNvPr id="2" name="Title 1">
+      <p:pic>
+        <p:nvPicPr>
+          <p:cNvPr id="4" name="Content Placeholder 3">
             <a:extLst>
               <a:ext uri="{FF2B5EF4-FFF2-40B4-BE49-F238E27FC236}">
-                <a16:creationId xmlns:a16="http://schemas.microsoft.com/office/drawing/2014/main" id="{2430A9A7-8010-45DA-93D6-9C04BDD22EC0}"/>
+                <a16:creationId xmlns:a16="http://schemas.microsoft.com/office/drawing/2014/main" id="{14DC487F-23E0-45ED-936C-2D548CCF18F6}"/>
               </a:ext>
             </a:extLst>
           </p:cNvPr>
-          <p:cNvSpPr>
-            <a:spLocks noGrp="1"/>
-          </p:cNvSpPr>
-          <p:nvPr>
-            <p:ph type="title"/>
-          </p:nvPr>
-        </p:nvSpPr>
-        <p:spPr/>
-        <p:txBody>
-          <a:bodyPr/>
-          <a:lstStyle/>
-          <a:p>
-            <a:r>
-              <a:rPr lang="en-GB" dirty="0"/>
-              <a:t>Pivoting</a:t>
-            </a:r>
-          </a:p>
-        </p:txBody>
-      </p:sp>
-      <p:sp>
-        <p:nvSpPr>
-          <p:cNvPr id="3" name="Content Placeholder 2">
+          <p:cNvPicPr>
+            <a:picLocks noGrp="1" noChangeAspect="1"/>
+          </p:cNvPicPr>
+          <p:nvPr>
+            <p:ph idx="1"/>
+          </p:nvPr>
+        </p:nvPicPr>
+        <p:blipFill>
+          <a:blip r:embed="rId2"/>
+          <a:stretch>
+            <a:fillRect/>
+          </a:stretch>
+        </p:blipFill>
+        <p:spPr>
+          <a:xfrm>
+            <a:off x="119448" y="118113"/>
+            <a:ext cx="10484434" cy="6412317"/>
+          </a:xfrm>
+          <a:prstGeom prst="rect">
+            <a:avLst/>
+          </a:prstGeom>
+        </p:spPr>
+      </p:pic>
+      <p:sp>
+        <p:nvSpPr>
+          <p:cNvPr id="5" name="Arrow: Left 4">
             <a:extLst>
               <a:ext uri="{FF2B5EF4-FFF2-40B4-BE49-F238E27FC236}">
-                <a16:creationId xmlns:a16="http://schemas.microsoft.com/office/drawing/2014/main" id="{1ED89FFA-49C1-4E27-9A07-86FF2D76F799}"/>
+                <a16:creationId xmlns:a16="http://schemas.microsoft.com/office/drawing/2014/main" id="{B242D611-5DE5-494A-AA92-EB82DEC97080}"/>
               </a:ext>
             </a:extLst>
           </p:cNvPr>
-          <p:cNvSpPr>
-            <a:spLocks noGrp="1"/>
-          </p:cNvSpPr>
-          <p:nvPr>
-            <p:ph idx="1"/>
-          </p:nvPr>
-        </p:nvSpPr>
-        <p:spPr/>
-        <p:txBody>
-          <a:bodyPr/>
-          <a:lstStyle/>
-          <a:p>
+          <p:cNvSpPr/>
+          <p:nvPr/>
+        </p:nvSpPr>
+        <p:spPr>
+          <a:xfrm>
+            <a:off x="7679288" y="3226300"/>
+            <a:ext cx="3927866" cy="405399"/>
+          </a:xfrm>
+          <a:prstGeom prst="leftArrow">
+            <a:avLst/>
+          </a:prstGeom>
+        </p:spPr>
+        <p:style>
+          <a:lnRef idx="2">
+            <a:schemeClr val="accent1">
+              <a:shade val="50000"/>
+            </a:schemeClr>
+          </a:lnRef>
+          <a:fillRef idx="1">
+            <a:schemeClr val="accent1"/>
+          </a:fillRef>
+          <a:effectRef idx="0">
+            <a:schemeClr val="accent1"/>
+          </a:effectRef>
+          <a:fontRef idx="minor">
+            <a:schemeClr val="lt1"/>
+          </a:fontRef>
+        </p:style>
+        <p:txBody>
+          <a:bodyPr rtlCol="0" anchor="ctr"/>
+          <a:lstStyle/>
+          <a:p>
+            <a:pPr algn="ctr"/>
             <a:endParaRPr lang="en-GB"/>
           </a:p>
         </p:txBody>
@@ -3801,7 +4426,7 @@
     </p:spTree>
     <p:extLst>
       <p:ext uri="{BB962C8B-B14F-4D97-AF65-F5344CB8AC3E}">
-        <p14:creationId xmlns:p14="http://schemas.microsoft.com/office/powerpoint/2010/main" val="3339806678"/>
+        <p14:creationId xmlns:p14="http://schemas.microsoft.com/office/powerpoint/2010/main" val="1980731210"/>
       </p:ext>
     </p:extLst>
   </p:cSld>
@@ -3833,7 +4458,7 @@
           <p:cNvPr id="2" name="Title 1">
             <a:extLst>
               <a:ext uri="{FF2B5EF4-FFF2-40B4-BE49-F238E27FC236}">
-                <a16:creationId xmlns:a16="http://schemas.microsoft.com/office/drawing/2014/main" id="{8CEFCF8F-2526-4E1B-B821-B2E8B941762D}"/>
+                <a16:creationId xmlns:a16="http://schemas.microsoft.com/office/drawing/2014/main" id="{669907C2-B12B-4BDE-B503-42117E2D46A5}"/>
               </a:ext>
             </a:extLst>
           </p:cNvPr>
@@ -3851,7 +4476,7 @@
           <a:p>
             <a:r>
               <a:rPr lang="en-GB" dirty="0"/>
-              <a:t>Unpivoting</a:t>
+              <a:t>SSMS - Custom Keyboard Shortcuts</a:t>
             </a:r>
           </a:p>
         </p:txBody>
@@ -3861,7 +4486,7 @@
           <p:cNvPr id="3" name="Content Placeholder 2">
             <a:extLst>
               <a:ext uri="{FF2B5EF4-FFF2-40B4-BE49-F238E27FC236}">
-                <a16:creationId xmlns:a16="http://schemas.microsoft.com/office/drawing/2014/main" id="{99E30CA9-3CDD-47F2-AD17-A9FADDC3E636}"/>
+                <a16:creationId xmlns:a16="http://schemas.microsoft.com/office/drawing/2014/main" id="{CFF1C2E9-47E3-43E4-BCE0-F9002DB3F924}"/>
               </a:ext>
             </a:extLst>
           </p:cNvPr>
@@ -3884,7 +4509,7 @@
     </p:spTree>
     <p:extLst>
       <p:ext uri="{BB962C8B-B14F-4D97-AF65-F5344CB8AC3E}">
-        <p14:creationId xmlns:p14="http://schemas.microsoft.com/office/powerpoint/2010/main" val="2735372073"/>
+        <p14:creationId xmlns:p14="http://schemas.microsoft.com/office/powerpoint/2010/main" val="3528901481"/>
       </p:ext>
     </p:extLst>
   </p:cSld>
@@ -3911,12 +4536,166 @@
           <a:chExt cx="0" cy="0"/>
         </a:xfrm>
       </p:grpSpPr>
+      <p:pic>
+        <p:nvPicPr>
+          <p:cNvPr id="4" name="Content Placeholder 3">
+            <a:extLst>
+              <a:ext uri="{FF2B5EF4-FFF2-40B4-BE49-F238E27FC236}">
+                <a16:creationId xmlns:a16="http://schemas.microsoft.com/office/drawing/2014/main" id="{8B2454C7-8D2A-46C6-AF59-D5D28CBFC449}"/>
+              </a:ext>
+            </a:extLst>
+          </p:cNvPr>
+          <p:cNvPicPr>
+            <a:picLocks noGrp="1" noChangeAspect="1"/>
+          </p:cNvPicPr>
+          <p:nvPr>
+            <p:ph idx="1"/>
+          </p:nvPr>
+        </p:nvPicPr>
+        <p:blipFill>
+          <a:blip r:embed="rId2"/>
+          <a:stretch>
+            <a:fillRect/>
+          </a:stretch>
+        </p:blipFill>
+        <p:spPr>
+          <a:xfrm>
+            <a:off x="137222" y="138245"/>
+            <a:ext cx="11350344" cy="6420210"/>
+          </a:xfrm>
+          <a:prstGeom prst="rect">
+            <a:avLst/>
+          </a:prstGeom>
+        </p:spPr>
+      </p:pic>
+      <p:sp>
+        <p:nvSpPr>
+          <p:cNvPr id="5" name="Arrow: Left 4">
+            <a:extLst>
+              <a:ext uri="{FF2B5EF4-FFF2-40B4-BE49-F238E27FC236}">
+                <a16:creationId xmlns:a16="http://schemas.microsoft.com/office/drawing/2014/main" id="{A063BA35-FC74-4FC6-B21C-F9142D2140E5}"/>
+              </a:ext>
+            </a:extLst>
+          </p:cNvPr>
+          <p:cNvSpPr/>
+          <p:nvPr/>
+        </p:nvSpPr>
+        <p:spPr>
+          <a:xfrm>
+            <a:off x="8490857" y="1427905"/>
+            <a:ext cx="3270219" cy="405399"/>
+          </a:xfrm>
+          <a:prstGeom prst="leftArrow">
+            <a:avLst/>
+          </a:prstGeom>
+        </p:spPr>
+        <p:style>
+          <a:lnRef idx="2">
+            <a:schemeClr val="accent1">
+              <a:shade val="50000"/>
+            </a:schemeClr>
+          </a:lnRef>
+          <a:fillRef idx="1">
+            <a:schemeClr val="accent1"/>
+          </a:fillRef>
+          <a:effectRef idx="0">
+            <a:schemeClr val="accent1"/>
+          </a:effectRef>
+          <a:fontRef idx="minor">
+            <a:schemeClr val="lt1"/>
+          </a:fontRef>
+        </p:style>
+        <p:txBody>
+          <a:bodyPr rtlCol="0" anchor="ctr"/>
+          <a:lstStyle/>
+          <a:p>
+            <a:pPr algn="ctr"/>
+            <a:endParaRPr lang="en-GB"/>
+          </a:p>
+        </p:txBody>
+      </p:sp>
+      <p:sp>
+        <p:nvSpPr>
+          <p:cNvPr id="6" name="Arrow: Left 5">
+            <a:extLst>
+              <a:ext uri="{FF2B5EF4-FFF2-40B4-BE49-F238E27FC236}">
+                <a16:creationId xmlns:a16="http://schemas.microsoft.com/office/drawing/2014/main" id="{A2C6F5BD-A5E6-4CA6-812B-2BE51E62299C}"/>
+              </a:ext>
+            </a:extLst>
+          </p:cNvPr>
+          <p:cNvSpPr/>
+          <p:nvPr/>
+        </p:nvSpPr>
+        <p:spPr>
+          <a:xfrm>
+            <a:off x="8490857" y="2437040"/>
+            <a:ext cx="3270219" cy="405399"/>
+          </a:xfrm>
+          <a:prstGeom prst="leftArrow">
+            <a:avLst/>
+          </a:prstGeom>
+        </p:spPr>
+        <p:style>
+          <a:lnRef idx="2">
+            <a:schemeClr val="accent1">
+              <a:shade val="50000"/>
+            </a:schemeClr>
+          </a:lnRef>
+          <a:fillRef idx="1">
+            <a:schemeClr val="accent1"/>
+          </a:fillRef>
+          <a:effectRef idx="0">
+            <a:schemeClr val="accent1"/>
+          </a:effectRef>
+          <a:fontRef idx="minor">
+            <a:schemeClr val="lt1"/>
+          </a:fontRef>
+        </p:style>
+        <p:txBody>
+          <a:bodyPr rtlCol="0" anchor="ctr"/>
+          <a:lstStyle/>
+          <a:p>
+            <a:pPr algn="ctr"/>
+            <a:endParaRPr lang="en-GB"/>
+          </a:p>
+        </p:txBody>
+      </p:sp>
+    </p:spTree>
+    <p:extLst>
+      <p:ext uri="{BB962C8B-B14F-4D97-AF65-F5344CB8AC3E}">
+        <p14:creationId xmlns:p14="http://schemas.microsoft.com/office/powerpoint/2010/main" val="815898707"/>
+      </p:ext>
+    </p:extLst>
+  </p:cSld>
+  <p:clrMapOvr>
+    <a:masterClrMapping/>
+  </p:clrMapOvr>
+</p:sld>
+</file>
+
+<file path=ppt/slides/slide14.xml><?xml version="1.0" encoding="utf-8"?>
+<p:sld xmlns:a="http://schemas.openxmlformats.org/drawingml/2006/main" xmlns:r="http://schemas.openxmlformats.org/officeDocument/2006/relationships" xmlns:p="http://schemas.openxmlformats.org/presentationml/2006/main">
+  <p:cSld>
+    <p:spTree>
+      <p:nvGrpSpPr>
+        <p:cNvPr id="1" name=""/>
+        <p:cNvGrpSpPr/>
+        <p:nvPr/>
+      </p:nvGrpSpPr>
+      <p:grpSpPr>
+        <a:xfrm>
+          <a:off x="0" y="0"/>
+          <a:ext cx="0" cy="0"/>
+          <a:chOff x="0" y="0"/>
+          <a:chExt cx="0" cy="0"/>
+        </a:xfrm>
+      </p:grpSpPr>
       <p:sp>
         <p:nvSpPr>
           <p:cNvPr id="2" name="Title 1">
             <a:extLst>
               <a:ext uri="{FF2B5EF4-FFF2-40B4-BE49-F238E27FC236}">
-                <a16:creationId xmlns:a16="http://schemas.microsoft.com/office/drawing/2014/main" id="{4645BADF-2035-4BA9-939C-18E0FAA253D6}"/>
+                <a16:creationId xmlns:a16="http://schemas.microsoft.com/office/drawing/2014/main" id="{FA8CD344-AF76-4724-8B3E-AD471485C4E9}"/>
               </a:ext>
             </a:extLst>
           </p:cNvPr>
@@ -3934,7 +4713,7 @@
           <a:p>
             <a:r>
               <a:rPr lang="en-GB" dirty="0"/>
-              <a:t>Putting It All Together</a:t>
+              <a:t>SSMS – Alt Key</a:t>
             </a:r>
           </a:p>
         </p:txBody>
@@ -3944,7 +4723,7 @@
           <p:cNvPr id="3" name="Content Placeholder 2">
             <a:extLst>
               <a:ext uri="{FF2B5EF4-FFF2-40B4-BE49-F238E27FC236}">
-                <a16:creationId xmlns:a16="http://schemas.microsoft.com/office/drawing/2014/main" id="{5F26FA5C-F239-41DE-9367-3F198CDD41C3}"/>
+                <a16:creationId xmlns:a16="http://schemas.microsoft.com/office/drawing/2014/main" id="{8DDB17F1-2417-4009-A29E-BA9E9F30D01E}"/>
               </a:ext>
             </a:extLst>
           </p:cNvPr>
@@ -3967,7 +4746,422 @@
     </p:spTree>
     <p:extLst>
       <p:ext uri="{BB962C8B-B14F-4D97-AF65-F5344CB8AC3E}">
-        <p14:creationId xmlns:p14="http://schemas.microsoft.com/office/powerpoint/2010/main" val="2139649521"/>
+        <p14:creationId xmlns:p14="http://schemas.microsoft.com/office/powerpoint/2010/main" val="535644834"/>
+      </p:ext>
+    </p:extLst>
+  </p:cSld>
+  <p:clrMapOvr>
+    <a:masterClrMapping/>
+  </p:clrMapOvr>
+</p:sld>
+</file>
+
+<file path=ppt/slides/slide15.xml><?xml version="1.0" encoding="utf-8"?>
+<p:sld xmlns:a="http://schemas.openxmlformats.org/drawingml/2006/main" xmlns:r="http://schemas.openxmlformats.org/officeDocument/2006/relationships" xmlns:p="http://schemas.openxmlformats.org/presentationml/2006/main">
+  <p:cSld>
+    <p:spTree>
+      <p:nvGrpSpPr>
+        <p:cNvPr id="1" name=""/>
+        <p:cNvGrpSpPr/>
+        <p:nvPr/>
+      </p:nvGrpSpPr>
+      <p:grpSpPr>
+        <a:xfrm>
+          <a:off x="0" y="0"/>
+          <a:ext cx="0" cy="0"/>
+          <a:chOff x="0" y="0"/>
+          <a:chExt cx="0" cy="0"/>
+        </a:xfrm>
+      </p:grpSpPr>
+      <p:sp>
+        <p:nvSpPr>
+          <p:cNvPr id="2" name="Title 1">
+            <a:extLst>
+              <a:ext uri="{FF2B5EF4-FFF2-40B4-BE49-F238E27FC236}">
+                <a16:creationId xmlns:a16="http://schemas.microsoft.com/office/drawing/2014/main" id="{6D4E5923-8D78-4F0A-8DEE-55EA1B3541C3}"/>
+              </a:ext>
+            </a:extLst>
+          </p:cNvPr>
+          <p:cNvSpPr>
+            <a:spLocks noGrp="1"/>
+          </p:cNvSpPr>
+          <p:nvPr>
+            <p:ph type="title"/>
+          </p:nvPr>
+        </p:nvSpPr>
+        <p:spPr/>
+        <p:txBody>
+          <a:bodyPr/>
+          <a:lstStyle/>
+          <a:p>
+            <a:r>
+              <a:rPr lang="en-GB" dirty="0"/>
+              <a:t>Common Table Expressions</a:t>
+            </a:r>
+          </a:p>
+        </p:txBody>
+      </p:sp>
+      <p:sp>
+        <p:nvSpPr>
+          <p:cNvPr id="3" name="Content Placeholder 2">
+            <a:extLst>
+              <a:ext uri="{FF2B5EF4-FFF2-40B4-BE49-F238E27FC236}">
+                <a16:creationId xmlns:a16="http://schemas.microsoft.com/office/drawing/2014/main" id="{5FF062B5-2D0C-40E6-B17F-25C9E2BEB3A4}"/>
+              </a:ext>
+            </a:extLst>
+          </p:cNvPr>
+          <p:cNvSpPr>
+            <a:spLocks noGrp="1"/>
+          </p:cNvSpPr>
+          <p:nvPr>
+            <p:ph idx="1"/>
+          </p:nvPr>
+        </p:nvSpPr>
+        <p:spPr/>
+        <p:txBody>
+          <a:bodyPr/>
+          <a:lstStyle/>
+          <a:p>
+            <a:endParaRPr lang="en-GB"/>
+          </a:p>
+        </p:txBody>
+      </p:sp>
+    </p:spTree>
+    <p:extLst>
+      <p:ext uri="{BB962C8B-B14F-4D97-AF65-F5344CB8AC3E}">
+        <p14:creationId xmlns:p14="http://schemas.microsoft.com/office/powerpoint/2010/main" val="70003774"/>
+      </p:ext>
+    </p:extLst>
+  </p:cSld>
+  <p:clrMapOvr>
+    <a:masterClrMapping/>
+  </p:clrMapOvr>
+</p:sld>
+</file>
+
+<file path=ppt/slides/slide16.xml><?xml version="1.0" encoding="utf-8"?>
+<p:sld xmlns:a="http://schemas.openxmlformats.org/drawingml/2006/main" xmlns:r="http://schemas.openxmlformats.org/officeDocument/2006/relationships" xmlns:p="http://schemas.openxmlformats.org/presentationml/2006/main">
+  <p:cSld>
+    <p:spTree>
+      <p:nvGrpSpPr>
+        <p:cNvPr id="1" name=""/>
+        <p:cNvGrpSpPr/>
+        <p:nvPr/>
+      </p:nvGrpSpPr>
+      <p:grpSpPr>
+        <a:xfrm>
+          <a:off x="0" y="0"/>
+          <a:ext cx="0" cy="0"/>
+          <a:chOff x="0" y="0"/>
+          <a:chExt cx="0" cy="0"/>
+        </a:xfrm>
+      </p:grpSpPr>
+      <p:sp>
+        <p:nvSpPr>
+          <p:cNvPr id="2" name="Title 1">
+            <a:extLst>
+              <a:ext uri="{FF2B5EF4-FFF2-40B4-BE49-F238E27FC236}">
+                <a16:creationId xmlns:a16="http://schemas.microsoft.com/office/drawing/2014/main" id="{FAB06CAB-9B44-44DB-814D-DA696F87A73C}"/>
+              </a:ext>
+            </a:extLst>
+          </p:cNvPr>
+          <p:cNvSpPr>
+            <a:spLocks noGrp="1"/>
+          </p:cNvSpPr>
+          <p:nvPr>
+            <p:ph type="title"/>
+          </p:nvPr>
+        </p:nvSpPr>
+        <p:spPr/>
+        <p:txBody>
+          <a:bodyPr/>
+          <a:lstStyle/>
+          <a:p>
+            <a:r>
+              <a:rPr lang="en-GB" dirty="0"/>
+              <a:t>APPLY</a:t>
+            </a:r>
+          </a:p>
+        </p:txBody>
+      </p:sp>
+      <p:sp>
+        <p:nvSpPr>
+          <p:cNvPr id="3" name="Content Placeholder 2">
+            <a:extLst>
+              <a:ext uri="{FF2B5EF4-FFF2-40B4-BE49-F238E27FC236}">
+                <a16:creationId xmlns:a16="http://schemas.microsoft.com/office/drawing/2014/main" id="{2D1F6816-B9EF-4A26-A84F-863BEBF7167E}"/>
+              </a:ext>
+            </a:extLst>
+          </p:cNvPr>
+          <p:cNvSpPr>
+            <a:spLocks noGrp="1"/>
+          </p:cNvSpPr>
+          <p:nvPr>
+            <p:ph idx="1"/>
+          </p:nvPr>
+        </p:nvSpPr>
+        <p:spPr/>
+        <p:txBody>
+          <a:bodyPr/>
+          <a:lstStyle/>
+          <a:p>
+            <a:endParaRPr lang="en-GB"/>
+          </a:p>
+        </p:txBody>
+      </p:sp>
+    </p:spTree>
+    <p:extLst>
+      <p:ext uri="{BB962C8B-B14F-4D97-AF65-F5344CB8AC3E}">
+        <p14:creationId xmlns:p14="http://schemas.microsoft.com/office/powerpoint/2010/main" val="2742647616"/>
+      </p:ext>
+    </p:extLst>
+  </p:cSld>
+  <p:clrMapOvr>
+    <a:masterClrMapping/>
+  </p:clrMapOvr>
+</p:sld>
+</file>
+
+<file path=ppt/slides/slide17.xml><?xml version="1.0" encoding="utf-8"?>
+<p:sld xmlns:a="http://schemas.openxmlformats.org/drawingml/2006/main" xmlns:r="http://schemas.openxmlformats.org/officeDocument/2006/relationships" xmlns:p="http://schemas.openxmlformats.org/presentationml/2006/main">
+  <p:cSld>
+    <p:spTree>
+      <p:nvGrpSpPr>
+        <p:cNvPr id="1" name=""/>
+        <p:cNvGrpSpPr/>
+        <p:nvPr/>
+      </p:nvGrpSpPr>
+      <p:grpSpPr>
+        <a:xfrm>
+          <a:off x="0" y="0"/>
+          <a:ext cx="0" cy="0"/>
+          <a:chOff x="0" y="0"/>
+          <a:chExt cx="0" cy="0"/>
+        </a:xfrm>
+      </p:grpSpPr>
+      <p:sp>
+        <p:nvSpPr>
+          <p:cNvPr id="2" name="Title 1">
+            <a:extLst>
+              <a:ext uri="{FF2B5EF4-FFF2-40B4-BE49-F238E27FC236}">
+                <a16:creationId xmlns:a16="http://schemas.microsoft.com/office/drawing/2014/main" id="{84B8720E-DDC4-460F-A7A9-C68BA31FEAA5}"/>
+              </a:ext>
+            </a:extLst>
+          </p:cNvPr>
+          <p:cNvSpPr>
+            <a:spLocks noGrp="1"/>
+          </p:cNvSpPr>
+          <p:nvPr>
+            <p:ph type="title"/>
+          </p:nvPr>
+        </p:nvSpPr>
+        <p:spPr/>
+        <p:txBody>
+          <a:bodyPr/>
+          <a:lstStyle/>
+          <a:p>
+            <a:r>
+              <a:rPr lang="en-GB" dirty="0"/>
+              <a:t>Window Functions</a:t>
+            </a:r>
+          </a:p>
+        </p:txBody>
+      </p:sp>
+      <p:sp>
+        <p:nvSpPr>
+          <p:cNvPr id="3" name="Content Placeholder 2">
+            <a:extLst>
+              <a:ext uri="{FF2B5EF4-FFF2-40B4-BE49-F238E27FC236}">
+                <a16:creationId xmlns:a16="http://schemas.microsoft.com/office/drawing/2014/main" id="{0E8B31F7-7A40-47F1-A123-C59ED07E9E3A}"/>
+              </a:ext>
+            </a:extLst>
+          </p:cNvPr>
+          <p:cNvSpPr>
+            <a:spLocks noGrp="1"/>
+          </p:cNvSpPr>
+          <p:nvPr>
+            <p:ph idx="1"/>
+          </p:nvPr>
+        </p:nvSpPr>
+        <p:spPr/>
+        <p:txBody>
+          <a:bodyPr/>
+          <a:lstStyle/>
+          <a:p>
+            <a:endParaRPr lang="en-GB"/>
+          </a:p>
+        </p:txBody>
+      </p:sp>
+    </p:spTree>
+    <p:extLst>
+      <p:ext uri="{BB962C8B-B14F-4D97-AF65-F5344CB8AC3E}">
+        <p14:creationId xmlns:p14="http://schemas.microsoft.com/office/powerpoint/2010/main" val="2340967242"/>
+      </p:ext>
+    </p:extLst>
+  </p:cSld>
+  <p:clrMapOvr>
+    <a:masterClrMapping/>
+  </p:clrMapOvr>
+</p:sld>
+</file>
+
+<file path=ppt/slides/slide18.xml><?xml version="1.0" encoding="utf-8"?>
+<p:sld xmlns:a="http://schemas.openxmlformats.org/drawingml/2006/main" xmlns:r="http://schemas.openxmlformats.org/officeDocument/2006/relationships" xmlns:p="http://schemas.openxmlformats.org/presentationml/2006/main">
+  <p:cSld>
+    <p:spTree>
+      <p:nvGrpSpPr>
+        <p:cNvPr id="1" name=""/>
+        <p:cNvGrpSpPr/>
+        <p:nvPr/>
+      </p:nvGrpSpPr>
+      <p:grpSpPr>
+        <a:xfrm>
+          <a:off x="0" y="0"/>
+          <a:ext cx="0" cy="0"/>
+          <a:chOff x="0" y="0"/>
+          <a:chExt cx="0" cy="0"/>
+        </a:xfrm>
+      </p:grpSpPr>
+      <p:sp>
+        <p:nvSpPr>
+          <p:cNvPr id="2" name="Title 1">
+            <a:extLst>
+              <a:ext uri="{FF2B5EF4-FFF2-40B4-BE49-F238E27FC236}">
+                <a16:creationId xmlns:a16="http://schemas.microsoft.com/office/drawing/2014/main" id="{2430A9A7-8010-45DA-93D6-9C04BDD22EC0}"/>
+              </a:ext>
+            </a:extLst>
+          </p:cNvPr>
+          <p:cNvSpPr>
+            <a:spLocks noGrp="1"/>
+          </p:cNvSpPr>
+          <p:nvPr>
+            <p:ph type="title"/>
+          </p:nvPr>
+        </p:nvSpPr>
+        <p:spPr/>
+        <p:txBody>
+          <a:bodyPr/>
+          <a:lstStyle/>
+          <a:p>
+            <a:r>
+              <a:rPr lang="en-GB" dirty="0"/>
+              <a:t>Pivoting</a:t>
+            </a:r>
+          </a:p>
+        </p:txBody>
+      </p:sp>
+      <p:sp>
+        <p:nvSpPr>
+          <p:cNvPr id="3" name="Content Placeholder 2">
+            <a:extLst>
+              <a:ext uri="{FF2B5EF4-FFF2-40B4-BE49-F238E27FC236}">
+                <a16:creationId xmlns:a16="http://schemas.microsoft.com/office/drawing/2014/main" id="{1ED89FFA-49C1-4E27-9A07-86FF2D76F799}"/>
+              </a:ext>
+            </a:extLst>
+          </p:cNvPr>
+          <p:cNvSpPr>
+            <a:spLocks noGrp="1"/>
+          </p:cNvSpPr>
+          <p:nvPr>
+            <p:ph idx="1"/>
+          </p:nvPr>
+        </p:nvSpPr>
+        <p:spPr/>
+        <p:txBody>
+          <a:bodyPr/>
+          <a:lstStyle/>
+          <a:p>
+            <a:endParaRPr lang="en-GB"/>
+          </a:p>
+        </p:txBody>
+      </p:sp>
+    </p:spTree>
+    <p:extLst>
+      <p:ext uri="{BB962C8B-B14F-4D97-AF65-F5344CB8AC3E}">
+        <p14:creationId xmlns:p14="http://schemas.microsoft.com/office/powerpoint/2010/main" val="3339806678"/>
+      </p:ext>
+    </p:extLst>
+  </p:cSld>
+  <p:clrMapOvr>
+    <a:masterClrMapping/>
+  </p:clrMapOvr>
+</p:sld>
+</file>
+
+<file path=ppt/slides/slide19.xml><?xml version="1.0" encoding="utf-8"?>
+<p:sld xmlns:a="http://schemas.openxmlformats.org/drawingml/2006/main" xmlns:r="http://schemas.openxmlformats.org/officeDocument/2006/relationships" xmlns:p="http://schemas.openxmlformats.org/presentationml/2006/main">
+  <p:cSld>
+    <p:spTree>
+      <p:nvGrpSpPr>
+        <p:cNvPr id="1" name=""/>
+        <p:cNvGrpSpPr/>
+        <p:nvPr/>
+      </p:nvGrpSpPr>
+      <p:grpSpPr>
+        <a:xfrm>
+          <a:off x="0" y="0"/>
+          <a:ext cx="0" cy="0"/>
+          <a:chOff x="0" y="0"/>
+          <a:chExt cx="0" cy="0"/>
+        </a:xfrm>
+      </p:grpSpPr>
+      <p:sp>
+        <p:nvSpPr>
+          <p:cNvPr id="2" name="Title 1">
+            <a:extLst>
+              <a:ext uri="{FF2B5EF4-FFF2-40B4-BE49-F238E27FC236}">
+                <a16:creationId xmlns:a16="http://schemas.microsoft.com/office/drawing/2014/main" id="{8CEFCF8F-2526-4E1B-B821-B2E8B941762D}"/>
+              </a:ext>
+            </a:extLst>
+          </p:cNvPr>
+          <p:cNvSpPr>
+            <a:spLocks noGrp="1"/>
+          </p:cNvSpPr>
+          <p:nvPr>
+            <p:ph type="title"/>
+          </p:nvPr>
+        </p:nvSpPr>
+        <p:spPr/>
+        <p:txBody>
+          <a:bodyPr/>
+          <a:lstStyle/>
+          <a:p>
+            <a:r>
+              <a:rPr lang="en-GB" dirty="0"/>
+              <a:t>Unpivoting</a:t>
+            </a:r>
+          </a:p>
+        </p:txBody>
+      </p:sp>
+      <p:sp>
+        <p:nvSpPr>
+          <p:cNvPr id="3" name="Content Placeholder 2">
+            <a:extLst>
+              <a:ext uri="{FF2B5EF4-FFF2-40B4-BE49-F238E27FC236}">
+                <a16:creationId xmlns:a16="http://schemas.microsoft.com/office/drawing/2014/main" id="{99E30CA9-3CDD-47F2-AD17-A9FADDC3E636}"/>
+              </a:ext>
+            </a:extLst>
+          </p:cNvPr>
+          <p:cNvSpPr>
+            <a:spLocks noGrp="1"/>
+          </p:cNvSpPr>
+          <p:nvPr>
+            <p:ph idx="1"/>
+          </p:nvPr>
+        </p:nvSpPr>
+        <p:spPr/>
+        <p:txBody>
+          <a:bodyPr/>
+          <a:lstStyle/>
+          <a:p>
+            <a:endParaRPr lang="en-GB"/>
+          </a:p>
+        </p:txBody>
+      </p:sp>
+    </p:spTree>
+    <p:extLst>
+      <p:ext uri="{BB962C8B-B14F-4D97-AF65-F5344CB8AC3E}">
+        <p14:creationId xmlns:p14="http://schemas.microsoft.com/office/powerpoint/2010/main" val="2735372073"/>
       </p:ext>
     </p:extLst>
   </p:cSld>
@@ -4010,40 +5204,22 @@
             <p:ph type="title"/>
           </p:nvPr>
         </p:nvSpPr>
-        <p:spPr/>
-        <p:txBody>
-          <a:bodyPr/>
-          <a:lstStyle/>
-          <a:p>
-            <a:r>
-              <a:rPr lang="en-GB" dirty="0"/>
+        <p:spPr>
+          <a:xfrm>
+            <a:off x="657225" y="499533"/>
+            <a:ext cx="4561446" cy="1658198"/>
+          </a:xfrm>
+        </p:spPr>
+        <p:txBody>
+          <a:bodyPr>
+            <a:normAutofit/>
+          </a:bodyPr>
+          <a:lstStyle/>
+          <a:p>
+            <a:r>
+              <a:rPr lang="en-GB" sz="8000" dirty="0"/>
               <a:t>About Me</a:t>
             </a:r>
-          </a:p>
-        </p:txBody>
-      </p:sp>
-      <p:sp>
-        <p:nvSpPr>
-          <p:cNvPr id="3" name="Content Placeholder 2">
-            <a:extLst>
-              <a:ext uri="{FF2B5EF4-FFF2-40B4-BE49-F238E27FC236}">
-                <a16:creationId xmlns:a16="http://schemas.microsoft.com/office/drawing/2014/main" id="{4A0A431F-A05F-406C-8FE4-2990B9AEBD64}"/>
-              </a:ext>
-            </a:extLst>
-          </p:cNvPr>
-          <p:cNvSpPr>
-            <a:spLocks noGrp="1"/>
-          </p:cNvSpPr>
-          <p:nvPr>
-            <p:ph idx="1"/>
-          </p:nvPr>
-        </p:nvSpPr>
-        <p:spPr/>
-        <p:txBody>
-          <a:bodyPr/>
-          <a:lstStyle/>
-          <a:p>
-            <a:endParaRPr lang="en-GB"/>
           </a:p>
         </p:txBody>
       </p:sp>
@@ -4051,6 +5227,89 @@
     <p:extLst>
       <p:ext uri="{BB962C8B-B14F-4D97-AF65-F5344CB8AC3E}">
         <p14:creationId xmlns:p14="http://schemas.microsoft.com/office/powerpoint/2010/main" val="3354740050"/>
+      </p:ext>
+    </p:extLst>
+  </p:cSld>
+  <p:clrMapOvr>
+    <a:masterClrMapping/>
+  </p:clrMapOvr>
+</p:sld>
+</file>
+
+<file path=ppt/slides/slide20.xml><?xml version="1.0" encoding="utf-8"?>
+<p:sld xmlns:a="http://schemas.openxmlformats.org/drawingml/2006/main" xmlns:r="http://schemas.openxmlformats.org/officeDocument/2006/relationships" xmlns:p="http://schemas.openxmlformats.org/presentationml/2006/main">
+  <p:cSld>
+    <p:spTree>
+      <p:nvGrpSpPr>
+        <p:cNvPr id="1" name=""/>
+        <p:cNvGrpSpPr/>
+        <p:nvPr/>
+      </p:nvGrpSpPr>
+      <p:grpSpPr>
+        <a:xfrm>
+          <a:off x="0" y="0"/>
+          <a:ext cx="0" cy="0"/>
+          <a:chOff x="0" y="0"/>
+          <a:chExt cx="0" cy="0"/>
+        </a:xfrm>
+      </p:grpSpPr>
+      <p:sp>
+        <p:nvSpPr>
+          <p:cNvPr id="2" name="Title 1">
+            <a:extLst>
+              <a:ext uri="{FF2B5EF4-FFF2-40B4-BE49-F238E27FC236}">
+                <a16:creationId xmlns:a16="http://schemas.microsoft.com/office/drawing/2014/main" id="{4645BADF-2035-4BA9-939C-18E0FAA253D6}"/>
+              </a:ext>
+            </a:extLst>
+          </p:cNvPr>
+          <p:cNvSpPr>
+            <a:spLocks noGrp="1"/>
+          </p:cNvSpPr>
+          <p:nvPr>
+            <p:ph type="title"/>
+          </p:nvPr>
+        </p:nvSpPr>
+        <p:spPr/>
+        <p:txBody>
+          <a:bodyPr/>
+          <a:lstStyle/>
+          <a:p>
+            <a:r>
+              <a:rPr lang="en-GB" dirty="0"/>
+              <a:t>Putting It All Together</a:t>
+            </a:r>
+          </a:p>
+        </p:txBody>
+      </p:sp>
+      <p:sp>
+        <p:nvSpPr>
+          <p:cNvPr id="3" name="Content Placeholder 2">
+            <a:extLst>
+              <a:ext uri="{FF2B5EF4-FFF2-40B4-BE49-F238E27FC236}">
+                <a16:creationId xmlns:a16="http://schemas.microsoft.com/office/drawing/2014/main" id="{5F26FA5C-F239-41DE-9367-3F198CDD41C3}"/>
+              </a:ext>
+            </a:extLst>
+          </p:cNvPr>
+          <p:cNvSpPr>
+            <a:spLocks noGrp="1"/>
+          </p:cNvSpPr>
+          <p:nvPr>
+            <p:ph idx="1"/>
+          </p:nvPr>
+        </p:nvSpPr>
+        <p:spPr/>
+        <p:txBody>
+          <a:bodyPr/>
+          <a:lstStyle/>
+          <a:p>
+            <a:endParaRPr lang="en-GB"/>
+          </a:p>
+        </p:txBody>
+      </p:sp>
+    </p:spTree>
+    <p:extLst>
+      <p:ext uri="{BB962C8B-B14F-4D97-AF65-F5344CB8AC3E}">
+        <p14:creationId xmlns:p14="http://schemas.microsoft.com/office/powerpoint/2010/main" val="2139649521"/>
       </p:ext>
     </p:extLst>
   </p:cSld>
@@ -4093,40 +5352,22 @@
             <p:ph type="title"/>
           </p:nvPr>
         </p:nvSpPr>
-        <p:spPr/>
-        <p:txBody>
-          <a:bodyPr/>
-          <a:lstStyle/>
-          <a:p>
-            <a:r>
-              <a:rPr lang="en-GB" dirty="0"/>
+        <p:spPr>
+          <a:xfrm>
+            <a:off x="657225" y="499533"/>
+            <a:ext cx="2955068" cy="1658198"/>
+          </a:xfrm>
+        </p:spPr>
+        <p:txBody>
+          <a:bodyPr>
+            <a:normAutofit/>
+          </a:bodyPr>
+          <a:lstStyle/>
+          <a:p>
+            <a:r>
+              <a:rPr lang="en-GB" sz="8000" dirty="0"/>
               <a:t>Why?</a:t>
             </a:r>
-          </a:p>
-        </p:txBody>
-      </p:sp>
-      <p:sp>
-        <p:nvSpPr>
-          <p:cNvPr id="3" name="Content Placeholder 2">
-            <a:extLst>
-              <a:ext uri="{FF2B5EF4-FFF2-40B4-BE49-F238E27FC236}">
-                <a16:creationId xmlns:a16="http://schemas.microsoft.com/office/drawing/2014/main" id="{91D2EB58-66B4-4EB8-AB90-34122619F965}"/>
-              </a:ext>
-            </a:extLst>
-          </p:cNvPr>
-          <p:cNvSpPr>
-            <a:spLocks noGrp="1"/>
-          </p:cNvSpPr>
-          <p:nvPr>
-            <p:ph idx="1"/>
-          </p:nvPr>
-        </p:nvSpPr>
-        <p:spPr/>
-        <p:txBody>
-          <a:bodyPr/>
-          <a:lstStyle/>
-          <a:p>
-            <a:endParaRPr lang="en-GB"/>
           </a:p>
         </p:txBody>
       </p:sp>
@@ -4776,55 +6017,80 @@
           <a:chExt cx="0" cy="0"/>
         </a:xfrm>
       </p:grpSpPr>
-      <p:sp>
-        <p:nvSpPr>
-          <p:cNvPr id="2" name="Title 1">
+      <p:pic>
+        <p:nvPicPr>
+          <p:cNvPr id="4" name="Content Placeholder 3">
             <a:extLst>
               <a:ext uri="{FF2B5EF4-FFF2-40B4-BE49-F238E27FC236}">
-                <a16:creationId xmlns:a16="http://schemas.microsoft.com/office/drawing/2014/main" id="{669907C2-B12B-4BDE-B503-42117E2D46A5}"/>
+                <a16:creationId xmlns:a16="http://schemas.microsoft.com/office/drawing/2014/main" id="{56CF9C9A-DF38-4DA5-902C-BCFB1594B1EB}"/>
               </a:ext>
             </a:extLst>
           </p:cNvPr>
-          <p:cNvSpPr>
-            <a:spLocks noGrp="1"/>
-          </p:cNvSpPr>
-          <p:nvPr>
-            <p:ph type="title"/>
-          </p:nvPr>
-        </p:nvSpPr>
-        <p:spPr/>
-        <p:txBody>
-          <a:bodyPr/>
-          <a:lstStyle/>
-          <a:p>
-            <a:r>
-              <a:rPr lang="en-GB" dirty="0"/>
-              <a:t>SSMS - Custom Keyboard Shortcuts</a:t>
-            </a:r>
-          </a:p>
-        </p:txBody>
-      </p:sp>
-      <p:sp>
-        <p:nvSpPr>
-          <p:cNvPr id="3" name="Content Placeholder 2">
+          <p:cNvPicPr>
+            <a:picLocks noGrp="1" noChangeAspect="1"/>
+          </p:cNvPicPr>
+          <p:nvPr>
+            <p:ph idx="1"/>
+          </p:nvPr>
+        </p:nvPicPr>
+        <p:blipFill>
+          <a:blip r:embed="rId2"/>
+          <a:stretch>
+            <a:fillRect/>
+          </a:stretch>
+        </p:blipFill>
+        <p:spPr>
+          <a:xfrm>
+            <a:off x="345303" y="274615"/>
+            <a:ext cx="9348517" cy="6308770"/>
+          </a:xfrm>
+          <a:prstGeom prst="rect">
+            <a:avLst/>
+          </a:prstGeom>
+        </p:spPr>
+      </p:pic>
+      <p:sp>
+        <p:nvSpPr>
+          <p:cNvPr id="5" name="Arrow: Left 4">
             <a:extLst>
               <a:ext uri="{FF2B5EF4-FFF2-40B4-BE49-F238E27FC236}">
-                <a16:creationId xmlns:a16="http://schemas.microsoft.com/office/drawing/2014/main" id="{CFF1C2E9-47E3-43E4-BCE0-F9002DB3F924}"/>
+                <a16:creationId xmlns:a16="http://schemas.microsoft.com/office/drawing/2014/main" id="{45C78777-32F2-4844-971D-7B37535B593E}"/>
               </a:ext>
             </a:extLst>
           </p:cNvPr>
-          <p:cNvSpPr>
-            <a:spLocks noGrp="1"/>
-          </p:cNvSpPr>
-          <p:nvPr>
-            <p:ph idx="1"/>
-          </p:nvPr>
-        </p:nvSpPr>
-        <p:spPr/>
-        <p:txBody>
-          <a:bodyPr/>
-          <a:lstStyle/>
-          <a:p>
+          <p:cNvSpPr/>
+          <p:nvPr/>
+        </p:nvSpPr>
+        <p:spPr>
+          <a:xfrm>
+            <a:off x="7101381" y="2627870"/>
+            <a:ext cx="3076468" cy="423417"/>
+          </a:xfrm>
+          <a:prstGeom prst="leftArrow">
+            <a:avLst/>
+          </a:prstGeom>
+        </p:spPr>
+        <p:style>
+          <a:lnRef idx="2">
+            <a:schemeClr val="accent1">
+              <a:shade val="50000"/>
+            </a:schemeClr>
+          </a:lnRef>
+          <a:fillRef idx="1">
+            <a:schemeClr val="accent1"/>
+          </a:fillRef>
+          <a:effectRef idx="0">
+            <a:schemeClr val="accent1"/>
+          </a:effectRef>
+          <a:fontRef idx="minor">
+            <a:schemeClr val="lt1"/>
+          </a:fontRef>
+        </p:style>
+        <p:txBody>
+          <a:bodyPr rtlCol="0" anchor="ctr"/>
+          <a:lstStyle/>
+          <a:p>
+            <a:pPr algn="ctr"/>
             <a:endParaRPr lang="en-GB"/>
           </a:p>
         </p:txBody>
@@ -4832,7 +6098,7 @@
     </p:spTree>
     <p:extLst>
       <p:ext uri="{BB962C8B-B14F-4D97-AF65-F5344CB8AC3E}">
-        <p14:creationId xmlns:p14="http://schemas.microsoft.com/office/powerpoint/2010/main" val="3528901481"/>
+        <p14:creationId xmlns:p14="http://schemas.microsoft.com/office/powerpoint/2010/main" val="1877771477"/>
       </p:ext>
     </p:extLst>
   </p:cSld>
@@ -4859,55 +6125,80 @@
           <a:chExt cx="0" cy="0"/>
         </a:xfrm>
       </p:grpSpPr>
-      <p:sp>
-        <p:nvSpPr>
-          <p:cNvPr id="2" name="Title 1">
+      <p:pic>
+        <p:nvPicPr>
+          <p:cNvPr id="4" name="Content Placeholder 3">
             <a:extLst>
               <a:ext uri="{FF2B5EF4-FFF2-40B4-BE49-F238E27FC236}">
-                <a16:creationId xmlns:a16="http://schemas.microsoft.com/office/drawing/2014/main" id="{FA8CD344-AF76-4724-8B3E-AD471485C4E9}"/>
+                <a16:creationId xmlns:a16="http://schemas.microsoft.com/office/drawing/2014/main" id="{E207DF32-7438-40EC-B297-A99BBE357710}"/>
               </a:ext>
             </a:extLst>
           </p:cNvPr>
-          <p:cNvSpPr>
-            <a:spLocks noGrp="1"/>
-          </p:cNvSpPr>
-          <p:nvPr>
-            <p:ph type="title"/>
-          </p:nvPr>
-        </p:nvSpPr>
-        <p:spPr/>
-        <p:txBody>
-          <a:bodyPr/>
-          <a:lstStyle/>
-          <a:p>
-            <a:r>
-              <a:rPr lang="en-GB" dirty="0"/>
-              <a:t>SSMS – Alt Key</a:t>
-            </a:r>
-          </a:p>
-        </p:txBody>
-      </p:sp>
-      <p:sp>
-        <p:nvSpPr>
-          <p:cNvPr id="3" name="Content Placeholder 2">
+          <p:cNvPicPr>
+            <a:picLocks noGrp="1" noChangeAspect="1"/>
+          </p:cNvPicPr>
+          <p:nvPr>
+            <p:ph idx="1"/>
+          </p:nvPr>
+        </p:nvPicPr>
+        <p:blipFill>
+          <a:blip r:embed="rId2"/>
+          <a:stretch>
+            <a:fillRect/>
+          </a:stretch>
+        </p:blipFill>
+        <p:spPr>
+          <a:xfrm>
+            <a:off x="270329" y="290669"/>
+            <a:ext cx="8034888" cy="5794821"/>
+          </a:xfrm>
+          <a:prstGeom prst="rect">
+            <a:avLst/>
+          </a:prstGeom>
+        </p:spPr>
+      </p:pic>
+      <p:sp>
+        <p:nvSpPr>
+          <p:cNvPr id="5" name="Arrow: Left 4">
             <a:extLst>
               <a:ext uri="{FF2B5EF4-FFF2-40B4-BE49-F238E27FC236}">
-                <a16:creationId xmlns:a16="http://schemas.microsoft.com/office/drawing/2014/main" id="{8DDB17F1-2417-4009-A29E-BA9E9F30D01E}"/>
+                <a16:creationId xmlns:a16="http://schemas.microsoft.com/office/drawing/2014/main" id="{1D6931A2-1D28-409D-80EF-5CD678FC3843}"/>
               </a:ext>
             </a:extLst>
           </p:cNvPr>
-          <p:cNvSpPr>
-            <a:spLocks noGrp="1"/>
-          </p:cNvSpPr>
-          <p:nvPr>
-            <p:ph idx="1"/>
-          </p:nvPr>
-        </p:nvSpPr>
-        <p:spPr/>
-        <p:txBody>
-          <a:bodyPr/>
-          <a:lstStyle/>
-          <a:p>
+          <p:cNvSpPr/>
+          <p:nvPr/>
+        </p:nvSpPr>
+        <p:spPr>
+          <a:xfrm>
+            <a:off x="4427858" y="2943647"/>
+            <a:ext cx="4427858" cy="382877"/>
+          </a:xfrm>
+          <a:prstGeom prst="leftArrow">
+            <a:avLst/>
+          </a:prstGeom>
+        </p:spPr>
+        <p:style>
+          <a:lnRef idx="2">
+            <a:schemeClr val="accent1">
+              <a:shade val="50000"/>
+            </a:schemeClr>
+          </a:lnRef>
+          <a:fillRef idx="1">
+            <a:schemeClr val="accent1"/>
+          </a:fillRef>
+          <a:effectRef idx="0">
+            <a:schemeClr val="accent1"/>
+          </a:effectRef>
+          <a:fontRef idx="minor">
+            <a:schemeClr val="lt1"/>
+          </a:fontRef>
+        </p:style>
+        <p:txBody>
+          <a:bodyPr rtlCol="0" anchor="ctr"/>
+          <a:lstStyle/>
+          <a:p>
+            <a:pPr algn="ctr"/>
             <a:endParaRPr lang="en-GB"/>
           </a:p>
         </p:txBody>
@@ -4915,7 +6206,7 @@
     </p:spTree>
     <p:extLst>
       <p:ext uri="{BB962C8B-B14F-4D97-AF65-F5344CB8AC3E}">
-        <p14:creationId xmlns:p14="http://schemas.microsoft.com/office/powerpoint/2010/main" val="535644834"/>
+        <p14:creationId xmlns:p14="http://schemas.microsoft.com/office/powerpoint/2010/main" val="3675734915"/>
       </p:ext>
     </p:extLst>
   </p:cSld>
@@ -4942,55 +6233,80 @@
           <a:chExt cx="0" cy="0"/>
         </a:xfrm>
       </p:grpSpPr>
-      <p:sp>
-        <p:nvSpPr>
-          <p:cNvPr id="2" name="Title 1">
+      <p:pic>
+        <p:nvPicPr>
+          <p:cNvPr id="4" name="Content Placeholder 3">
             <a:extLst>
               <a:ext uri="{FF2B5EF4-FFF2-40B4-BE49-F238E27FC236}">
-                <a16:creationId xmlns:a16="http://schemas.microsoft.com/office/drawing/2014/main" id="{6D4E5923-8D78-4F0A-8DEE-55EA1B3541C3}"/>
+                <a16:creationId xmlns:a16="http://schemas.microsoft.com/office/drawing/2014/main" id="{11D88558-1DC5-4B10-8EF0-CDB59F2F51B6}"/>
               </a:ext>
             </a:extLst>
           </p:cNvPr>
-          <p:cNvSpPr>
-            <a:spLocks noGrp="1"/>
-          </p:cNvSpPr>
-          <p:nvPr>
-            <p:ph type="title"/>
-          </p:nvPr>
-        </p:nvSpPr>
-        <p:spPr/>
-        <p:txBody>
-          <a:bodyPr/>
-          <a:lstStyle/>
-          <a:p>
-            <a:r>
-              <a:rPr lang="en-GB" dirty="0"/>
-              <a:t>Common Table Expressions</a:t>
-            </a:r>
-          </a:p>
-        </p:txBody>
-      </p:sp>
-      <p:sp>
-        <p:nvSpPr>
-          <p:cNvPr id="3" name="Content Placeholder 2">
+          <p:cNvPicPr>
+            <a:picLocks noGrp="1" noChangeAspect="1"/>
+          </p:cNvPicPr>
+          <p:nvPr>
+            <p:ph idx="1"/>
+          </p:nvPr>
+        </p:nvPicPr>
+        <p:blipFill>
+          <a:blip r:embed="rId2"/>
+          <a:stretch>
+            <a:fillRect/>
+          </a:stretch>
+        </p:blipFill>
+        <p:spPr>
+          <a:xfrm>
+            <a:off x="239492" y="196076"/>
+            <a:ext cx="9027111" cy="6434450"/>
+          </a:xfrm>
+          <a:prstGeom prst="rect">
+            <a:avLst/>
+          </a:prstGeom>
+        </p:spPr>
+      </p:pic>
+      <p:sp>
+        <p:nvSpPr>
+          <p:cNvPr id="5" name="Arrow: Left 4">
             <a:extLst>
               <a:ext uri="{FF2B5EF4-FFF2-40B4-BE49-F238E27FC236}">
-                <a16:creationId xmlns:a16="http://schemas.microsoft.com/office/drawing/2014/main" id="{5FF062B5-2D0C-40E6-B17F-25C9E2BEB3A4}"/>
+                <a16:creationId xmlns:a16="http://schemas.microsoft.com/office/drawing/2014/main" id="{B1583507-ECEA-4DFF-9E0E-D50FF968D2C3}"/>
               </a:ext>
             </a:extLst>
           </p:cNvPr>
-          <p:cNvSpPr>
-            <a:spLocks noGrp="1"/>
-          </p:cNvSpPr>
-          <p:nvPr>
-            <p:ph idx="1"/>
-          </p:nvPr>
-        </p:nvSpPr>
-        <p:spPr/>
-        <p:txBody>
-          <a:bodyPr/>
-          <a:lstStyle/>
-          <a:p>
+          <p:cNvSpPr/>
+          <p:nvPr/>
+        </p:nvSpPr>
+        <p:spPr>
+          <a:xfrm>
+            <a:off x="6418817" y="3852305"/>
+            <a:ext cx="4414345" cy="454948"/>
+          </a:xfrm>
+          <a:prstGeom prst="leftArrow">
+            <a:avLst/>
+          </a:prstGeom>
+        </p:spPr>
+        <p:style>
+          <a:lnRef idx="2">
+            <a:schemeClr val="accent1">
+              <a:shade val="50000"/>
+            </a:schemeClr>
+          </a:lnRef>
+          <a:fillRef idx="1">
+            <a:schemeClr val="accent1"/>
+          </a:fillRef>
+          <a:effectRef idx="0">
+            <a:schemeClr val="accent1"/>
+          </a:effectRef>
+          <a:fontRef idx="minor">
+            <a:schemeClr val="lt1"/>
+          </a:fontRef>
+        </p:style>
+        <p:txBody>
+          <a:bodyPr rtlCol="0" anchor="ctr"/>
+          <a:lstStyle/>
+          <a:p>
+            <a:pPr algn="ctr"/>
             <a:endParaRPr lang="en-GB"/>
           </a:p>
         </p:txBody>
@@ -4998,7 +6314,7 @@
     </p:spTree>
     <p:extLst>
       <p:ext uri="{BB962C8B-B14F-4D97-AF65-F5344CB8AC3E}">
-        <p14:creationId xmlns:p14="http://schemas.microsoft.com/office/powerpoint/2010/main" val="70003774"/>
+        <p14:creationId xmlns:p14="http://schemas.microsoft.com/office/powerpoint/2010/main" val="2615885262"/>
       </p:ext>
     </p:extLst>
   </p:cSld>
@@ -5025,55 +6341,218 @@
           <a:chExt cx="0" cy="0"/>
         </a:xfrm>
       </p:grpSpPr>
-      <p:sp>
-        <p:nvSpPr>
-          <p:cNvPr id="2" name="Title 1">
+      <p:pic>
+        <p:nvPicPr>
+          <p:cNvPr id="4" name="Content Placeholder 3">
             <a:extLst>
               <a:ext uri="{FF2B5EF4-FFF2-40B4-BE49-F238E27FC236}">
-                <a16:creationId xmlns:a16="http://schemas.microsoft.com/office/drawing/2014/main" id="{FAB06CAB-9B44-44DB-814D-DA696F87A73C}"/>
+                <a16:creationId xmlns:a16="http://schemas.microsoft.com/office/drawing/2014/main" id="{78BFB897-ACBB-4CBA-8B04-A7B6A2DA867D}"/>
               </a:ext>
             </a:extLst>
           </p:cNvPr>
-          <p:cNvSpPr>
-            <a:spLocks noGrp="1"/>
-          </p:cNvSpPr>
-          <p:nvPr>
-            <p:ph type="title"/>
-          </p:nvPr>
-        </p:nvSpPr>
-        <p:spPr/>
-        <p:txBody>
-          <a:bodyPr/>
-          <a:lstStyle/>
-          <a:p>
-            <a:r>
-              <a:rPr lang="en-GB" dirty="0"/>
-              <a:t>APPLY</a:t>
-            </a:r>
-          </a:p>
-        </p:txBody>
-      </p:sp>
-      <p:sp>
-        <p:nvSpPr>
-          <p:cNvPr id="3" name="Content Placeholder 2">
+          <p:cNvPicPr>
+            <a:picLocks noGrp="1" noChangeAspect="1"/>
+          </p:cNvPicPr>
+          <p:nvPr>
+            <p:ph idx="1"/>
+          </p:nvPr>
+        </p:nvPicPr>
+        <p:blipFill>
+          <a:blip r:embed="rId2"/>
+          <a:stretch>
+            <a:fillRect/>
+          </a:stretch>
+        </p:blipFill>
+        <p:spPr>
+          <a:xfrm>
+            <a:off x="180932" y="101983"/>
+            <a:ext cx="10477660" cy="6453631"/>
+          </a:xfrm>
+          <a:prstGeom prst="rect">
+            <a:avLst/>
+          </a:prstGeom>
+        </p:spPr>
+      </p:pic>
+      <p:sp>
+        <p:nvSpPr>
+          <p:cNvPr id="5" name="Arrow: Left 4">
             <a:extLst>
               <a:ext uri="{FF2B5EF4-FFF2-40B4-BE49-F238E27FC236}">
-                <a16:creationId xmlns:a16="http://schemas.microsoft.com/office/drawing/2014/main" id="{2D1F6816-B9EF-4A26-A84F-863BEBF7167E}"/>
+                <a16:creationId xmlns:a16="http://schemas.microsoft.com/office/drawing/2014/main" id="{DE56B7BC-3096-4DD6-91C6-A3C0B88F2CEF}"/>
               </a:ext>
             </a:extLst>
           </p:cNvPr>
-          <p:cNvSpPr>
-            <a:spLocks noGrp="1"/>
-          </p:cNvSpPr>
-          <p:nvPr>
-            <p:ph idx="1"/>
-          </p:nvPr>
-        </p:nvSpPr>
-        <p:spPr/>
-        <p:txBody>
-          <a:bodyPr/>
-          <a:lstStyle/>
-          <a:p>
+          <p:cNvSpPr/>
+          <p:nvPr/>
+        </p:nvSpPr>
+        <p:spPr>
+          <a:xfrm>
+            <a:off x="8342999" y="3477016"/>
+            <a:ext cx="3256705" cy="355850"/>
+          </a:xfrm>
+          <a:prstGeom prst="leftArrow">
+            <a:avLst/>
+          </a:prstGeom>
+        </p:spPr>
+        <p:style>
+          <a:lnRef idx="2">
+            <a:schemeClr val="accent1">
+              <a:shade val="50000"/>
+            </a:schemeClr>
+          </a:lnRef>
+          <a:fillRef idx="1">
+            <a:schemeClr val="accent1"/>
+          </a:fillRef>
+          <a:effectRef idx="0">
+            <a:schemeClr val="accent1"/>
+          </a:effectRef>
+          <a:fontRef idx="minor">
+            <a:schemeClr val="lt1"/>
+          </a:fontRef>
+        </p:style>
+        <p:txBody>
+          <a:bodyPr rtlCol="0" anchor="ctr"/>
+          <a:lstStyle/>
+          <a:p>
+            <a:pPr algn="ctr"/>
+            <a:endParaRPr lang="en-GB"/>
+          </a:p>
+        </p:txBody>
+      </p:sp>
+      <p:sp>
+        <p:nvSpPr>
+          <p:cNvPr id="6" name="Arrow: Left 5">
+            <a:extLst>
+              <a:ext uri="{FF2B5EF4-FFF2-40B4-BE49-F238E27FC236}">
+                <a16:creationId xmlns:a16="http://schemas.microsoft.com/office/drawing/2014/main" id="{30227E88-5E8F-4E27-92D1-808D6940104F}"/>
+              </a:ext>
+            </a:extLst>
+          </p:cNvPr>
+          <p:cNvSpPr/>
+          <p:nvPr/>
+        </p:nvSpPr>
+        <p:spPr>
+          <a:xfrm>
+            <a:off x="8343000" y="4043403"/>
+            <a:ext cx="3256705" cy="355850"/>
+          </a:xfrm>
+          <a:prstGeom prst="leftArrow">
+            <a:avLst/>
+          </a:prstGeom>
+        </p:spPr>
+        <p:style>
+          <a:lnRef idx="2">
+            <a:schemeClr val="accent1">
+              <a:shade val="50000"/>
+            </a:schemeClr>
+          </a:lnRef>
+          <a:fillRef idx="1">
+            <a:schemeClr val="accent1"/>
+          </a:fillRef>
+          <a:effectRef idx="0">
+            <a:schemeClr val="accent1"/>
+          </a:effectRef>
+          <a:fontRef idx="minor">
+            <a:schemeClr val="lt1"/>
+          </a:fontRef>
+        </p:style>
+        <p:txBody>
+          <a:bodyPr rtlCol="0" anchor="ctr"/>
+          <a:lstStyle/>
+          <a:p>
+            <a:pPr algn="ctr"/>
+            <a:endParaRPr lang="en-GB"/>
+          </a:p>
+        </p:txBody>
+      </p:sp>
+      <p:sp>
+        <p:nvSpPr>
+          <p:cNvPr id="7" name="Arrow: Left 6">
+            <a:extLst>
+              <a:ext uri="{FF2B5EF4-FFF2-40B4-BE49-F238E27FC236}">
+                <a16:creationId xmlns:a16="http://schemas.microsoft.com/office/drawing/2014/main" id="{6A806346-3673-42DB-8C66-114026302EAA}"/>
+              </a:ext>
+            </a:extLst>
+          </p:cNvPr>
+          <p:cNvSpPr/>
+          <p:nvPr/>
+        </p:nvSpPr>
+        <p:spPr>
+          <a:xfrm>
+            <a:off x="8343001" y="4609790"/>
+            <a:ext cx="3256705" cy="355850"/>
+          </a:xfrm>
+          <a:prstGeom prst="leftArrow">
+            <a:avLst/>
+          </a:prstGeom>
+        </p:spPr>
+        <p:style>
+          <a:lnRef idx="2">
+            <a:schemeClr val="accent1">
+              <a:shade val="50000"/>
+            </a:schemeClr>
+          </a:lnRef>
+          <a:fillRef idx="1">
+            <a:schemeClr val="accent1"/>
+          </a:fillRef>
+          <a:effectRef idx="0">
+            <a:schemeClr val="accent1"/>
+          </a:effectRef>
+          <a:fontRef idx="minor">
+            <a:schemeClr val="lt1"/>
+          </a:fontRef>
+        </p:style>
+        <p:txBody>
+          <a:bodyPr rtlCol="0" anchor="ctr"/>
+          <a:lstStyle/>
+          <a:p>
+            <a:pPr algn="ctr"/>
+            <a:endParaRPr lang="en-GB"/>
+          </a:p>
+        </p:txBody>
+      </p:sp>
+      <p:sp>
+        <p:nvSpPr>
+          <p:cNvPr id="8" name="Arrow: Left 7">
+            <a:extLst>
+              <a:ext uri="{FF2B5EF4-FFF2-40B4-BE49-F238E27FC236}">
+                <a16:creationId xmlns:a16="http://schemas.microsoft.com/office/drawing/2014/main" id="{19BFD65D-73D6-4341-91D5-48C912FCCFBE}"/>
+              </a:ext>
+            </a:extLst>
+          </p:cNvPr>
+          <p:cNvSpPr/>
+          <p:nvPr/>
+        </p:nvSpPr>
+        <p:spPr>
+          <a:xfrm>
+            <a:off x="8343002" y="4940115"/>
+            <a:ext cx="3256705" cy="355850"/>
+          </a:xfrm>
+          <a:prstGeom prst="leftArrow">
+            <a:avLst/>
+          </a:prstGeom>
+        </p:spPr>
+        <p:style>
+          <a:lnRef idx="2">
+            <a:schemeClr val="accent1">
+              <a:shade val="50000"/>
+            </a:schemeClr>
+          </a:lnRef>
+          <a:fillRef idx="1">
+            <a:schemeClr val="accent1"/>
+          </a:fillRef>
+          <a:effectRef idx="0">
+            <a:schemeClr val="accent1"/>
+          </a:effectRef>
+          <a:fontRef idx="minor">
+            <a:schemeClr val="lt1"/>
+          </a:fontRef>
+        </p:style>
+        <p:txBody>
+          <a:bodyPr rtlCol="0" anchor="ctr"/>
+          <a:lstStyle/>
+          <a:p>
+            <a:pPr algn="ctr"/>
             <a:endParaRPr lang="en-GB"/>
           </a:p>
         </p:txBody>
@@ -5081,7 +6560,7 @@
     </p:spTree>
     <p:extLst>
       <p:ext uri="{BB962C8B-B14F-4D97-AF65-F5344CB8AC3E}">
-        <p14:creationId xmlns:p14="http://schemas.microsoft.com/office/powerpoint/2010/main" val="2742647616"/>
+        <p14:creationId xmlns:p14="http://schemas.microsoft.com/office/powerpoint/2010/main" val="122906651"/>
       </p:ext>
     </p:extLst>
   </p:cSld>

</xml_diff>